<commit_message>
revised a power point that describes how API authorization of Amplify works.
</commit_message>
<xml_diff>
--- a/explain_AmplifyApiAuthZ/AmplifyApiAuthZ.pptx
+++ b/explain_AmplifyApiAuthZ/AmplifyApiAuthZ.pptx
@@ -255,7 +255,7 @@
           <a:p>
             <a:fld id="{A68BD031-50F9-4E04-8434-9CE5533E09C7}" type="datetimeFigureOut">
               <a:rPr lang="en-US" smtClean="0"/>
-              <a:t>3/20/2020</a:t>
+              <a:t>3/22/2020</a:t>
             </a:fld>
             <a:endParaRPr lang="en-US"/>
           </a:p>
@@ -457,7 +457,7 @@
           <a:p>
             <a:fld id="{A68BD031-50F9-4E04-8434-9CE5533E09C7}" type="datetimeFigureOut">
               <a:rPr lang="en-US" smtClean="0"/>
-              <a:t>3/20/2020</a:t>
+              <a:t>3/22/2020</a:t>
             </a:fld>
             <a:endParaRPr lang="en-US"/>
           </a:p>
@@ -669,7 +669,7 @@
           <a:p>
             <a:fld id="{A68BD031-50F9-4E04-8434-9CE5533E09C7}" type="datetimeFigureOut">
               <a:rPr lang="en-US" smtClean="0"/>
-              <a:t>3/20/2020</a:t>
+              <a:t>3/22/2020</a:t>
             </a:fld>
             <a:endParaRPr lang="en-US"/>
           </a:p>
@@ -871,7 +871,7 @@
           <a:p>
             <a:fld id="{A68BD031-50F9-4E04-8434-9CE5533E09C7}" type="datetimeFigureOut">
               <a:rPr lang="en-US" smtClean="0"/>
-              <a:t>3/20/2020</a:t>
+              <a:t>3/22/2020</a:t>
             </a:fld>
             <a:endParaRPr lang="en-US"/>
           </a:p>
@@ -1117,7 +1117,7 @@
           <a:p>
             <a:fld id="{A68BD031-50F9-4E04-8434-9CE5533E09C7}" type="datetimeFigureOut">
               <a:rPr lang="en-US" smtClean="0"/>
-              <a:t>3/20/2020</a:t>
+              <a:t>3/22/2020</a:t>
             </a:fld>
             <a:endParaRPr lang="en-US"/>
           </a:p>
@@ -1413,7 +1413,7 @@
           <a:p>
             <a:fld id="{A68BD031-50F9-4E04-8434-9CE5533E09C7}" type="datetimeFigureOut">
               <a:rPr lang="en-US" smtClean="0"/>
-              <a:t>3/20/2020</a:t>
+              <a:t>3/22/2020</a:t>
             </a:fld>
             <a:endParaRPr lang="en-US"/>
           </a:p>
@@ -1844,7 +1844,7 @@
           <a:p>
             <a:fld id="{A68BD031-50F9-4E04-8434-9CE5533E09C7}" type="datetimeFigureOut">
               <a:rPr lang="en-US" smtClean="0"/>
-              <a:t>3/20/2020</a:t>
+              <a:t>3/22/2020</a:t>
             </a:fld>
             <a:endParaRPr lang="en-US"/>
           </a:p>
@@ -1962,7 +1962,7 @@
           <a:p>
             <a:fld id="{A68BD031-50F9-4E04-8434-9CE5533E09C7}" type="datetimeFigureOut">
               <a:rPr lang="en-US" smtClean="0"/>
-              <a:t>3/20/2020</a:t>
+              <a:t>3/22/2020</a:t>
             </a:fld>
             <a:endParaRPr lang="en-US"/>
           </a:p>
@@ -2057,7 +2057,7 @@
           <a:p>
             <a:fld id="{A68BD031-50F9-4E04-8434-9CE5533E09C7}" type="datetimeFigureOut">
               <a:rPr lang="en-US" smtClean="0"/>
-              <a:t>3/20/2020</a:t>
+              <a:t>3/22/2020</a:t>
             </a:fld>
             <a:endParaRPr lang="en-US"/>
           </a:p>
@@ -2366,7 +2366,7 @@
           <a:p>
             <a:fld id="{A68BD031-50F9-4E04-8434-9CE5533E09C7}" type="datetimeFigureOut">
               <a:rPr lang="en-US" smtClean="0"/>
-              <a:t>3/20/2020</a:t>
+              <a:t>3/22/2020</a:t>
             </a:fld>
             <a:endParaRPr lang="en-US"/>
           </a:p>
@@ -2619,7 +2619,7 @@
           <a:p>
             <a:fld id="{A68BD031-50F9-4E04-8434-9CE5533E09C7}" type="datetimeFigureOut">
               <a:rPr lang="en-US" smtClean="0"/>
-              <a:t>3/20/2020</a:t>
+              <a:t>3/22/2020</a:t>
             </a:fld>
             <a:endParaRPr lang="en-US"/>
           </a:p>
@@ -2864,7 +2864,7 @@
           <a:p>
             <a:fld id="{A68BD031-50F9-4E04-8434-9CE5533E09C7}" type="datetimeFigureOut">
               <a:rPr lang="en-US" smtClean="0"/>
-              <a:t>3/20/2020</a:t>
+              <a:t>3/22/2020</a:t>
             </a:fld>
             <a:endParaRPr lang="en-US"/>
           </a:p>
@@ -3577,7 +3577,7 @@
           <a:blip r:embed="rId2">
             <a:extLst>
               <a:ext uri="{96DAC541-7B7A-43D3-8B79-37D633B846F1}">
-                <asvg:svgBlip xmlns:asvg="http://schemas.microsoft.com/office/drawing/2016/SVG/main" xmlns="" r:embed="rId15"/>
+                <asvg:svgBlip xmlns="" xmlns:asvg="http://schemas.microsoft.com/office/drawing/2016/SVG/main" r:embed="rId15"/>
               </a:ext>
             </a:extLst>
           </a:blip>
@@ -3677,7 +3677,7 @@
           <a:blip r:embed="rId16">
             <a:extLst>
               <a:ext uri="{96DAC541-7B7A-43D3-8B79-37D633B846F1}">
-                <asvg:svgBlip xmlns:asvg="http://schemas.microsoft.com/office/drawing/2016/SVG/main" xmlns="" r:embed="rId37"/>
+                <asvg:svgBlip xmlns="" xmlns:asvg="http://schemas.microsoft.com/office/drawing/2016/SVG/main" r:embed="rId37"/>
               </a:ext>
             </a:extLst>
           </a:blip>
@@ -3818,7 +3818,7 @@
           <a:blip r:embed="rId38">
             <a:extLst>
               <a:ext uri="{96DAC541-7B7A-43D3-8B79-37D633B846F1}">
-                <asvg:svgBlip xmlns:asvg="http://schemas.microsoft.com/office/drawing/2016/SVG/main" xmlns="" r:embed="rId9"/>
+                <asvg:svgBlip xmlns="" xmlns:asvg="http://schemas.microsoft.com/office/drawing/2016/SVG/main" r:embed="rId9"/>
               </a:ext>
             </a:extLst>
           </a:blip>
@@ -3910,7 +3910,7 @@
           <a:blip r:embed="rId38">
             <a:extLst>
               <a:ext uri="{96DAC541-7B7A-43D3-8B79-37D633B846F1}">
-                <asvg:svgBlip xmlns:asvg="http://schemas.microsoft.com/office/drawing/2016/SVG/main" xmlns="" r:embed="rId9"/>
+                <asvg:svgBlip xmlns="" xmlns:asvg="http://schemas.microsoft.com/office/drawing/2016/SVG/main" r:embed="rId9"/>
               </a:ext>
             </a:extLst>
           </a:blip>
@@ -4018,7 +4018,7 @@
           <a:blip r:embed="rId39">
             <a:extLst>
               <a:ext uri="{96DAC541-7B7A-43D3-8B79-37D633B846F1}">
-                <asvg:svgBlip xmlns:asvg="http://schemas.microsoft.com/office/drawing/2016/SVG/main" xmlns="" r:embed="rId11"/>
+                <asvg:svgBlip xmlns="" xmlns:asvg="http://schemas.microsoft.com/office/drawing/2016/SVG/main" r:embed="rId11"/>
               </a:ext>
             </a:extLst>
           </a:blip>
@@ -4054,7 +4054,7 @@
           <a:blip r:embed="rId40">
             <a:extLst>
               <a:ext uri="{96DAC541-7B7A-43D3-8B79-37D633B846F1}">
-                <asvg:svgBlip xmlns:asvg="http://schemas.microsoft.com/office/drawing/2016/SVG/main" xmlns="" r:embed="rId6"/>
+                <asvg:svgBlip xmlns="" xmlns:asvg="http://schemas.microsoft.com/office/drawing/2016/SVG/main" r:embed="rId6"/>
               </a:ext>
             </a:extLst>
           </a:blip>
@@ -4233,7 +4233,7 @@
           <a:blip r:embed="rId41">
             <a:extLst>
               <a:ext uri="{96DAC541-7B7A-43D3-8B79-37D633B846F1}">
-                <asvg:svgBlip xmlns:asvg="http://schemas.microsoft.com/office/drawing/2016/SVG/main" xmlns="" r:embed="rId5"/>
+                <asvg:svgBlip xmlns="" xmlns:asvg="http://schemas.microsoft.com/office/drawing/2016/SVG/main" r:embed="rId5"/>
               </a:ext>
             </a:extLst>
           </a:blip>
@@ -4352,7 +4352,7 @@
           <a:blip r:embed="rId42">
             <a:extLst>
               <a:ext uri="{96DAC541-7B7A-43D3-8B79-37D633B846F1}">
-                <asvg:svgBlip xmlns:asvg="http://schemas.microsoft.com/office/drawing/2016/SVG/main" xmlns="" r:embed="rId25"/>
+                <asvg:svgBlip xmlns="" xmlns:asvg="http://schemas.microsoft.com/office/drawing/2016/SVG/main" r:embed="rId25"/>
               </a:ext>
             </a:extLst>
           </a:blip>
@@ -4424,7 +4424,7 @@
           <a:blip r:embed="rId42">
             <a:extLst>
               <a:ext uri="{96DAC541-7B7A-43D3-8B79-37D633B846F1}">
-                <asvg:svgBlip xmlns:asvg="http://schemas.microsoft.com/office/drawing/2016/SVG/main" xmlns="" r:embed="rId25"/>
+                <asvg:svgBlip xmlns="" xmlns:asvg="http://schemas.microsoft.com/office/drawing/2016/SVG/main" r:embed="rId25"/>
               </a:ext>
             </a:extLst>
           </a:blip>
@@ -4592,7 +4592,7 @@
           <a:blip r:embed="rId43">
             <a:extLst>
               <a:ext uri="{96DAC541-7B7A-43D3-8B79-37D633B846F1}">
-                <asvg:svgBlip xmlns:asvg="http://schemas.microsoft.com/office/drawing/2016/SVG/main" xmlns="" r:embed="rId17"/>
+                <asvg:svgBlip xmlns="" xmlns:asvg="http://schemas.microsoft.com/office/drawing/2016/SVG/main" r:embed="rId17"/>
               </a:ext>
             </a:extLst>
           </a:blip>
@@ -4839,7 +4839,7 @@
           <a:blip r:embed="rId47">
             <a:extLst>
               <a:ext uri="{96DAC541-7B7A-43D3-8B79-37D633B846F1}">
-                <asvg:svgBlip xmlns="" xmlns:asvg="http://schemas.microsoft.com/office/drawing/2016/SVG/main" r:embed="rId48"/>
+                <asvg:svgBlip xmlns:asvg="http://schemas.microsoft.com/office/drawing/2016/SVG/main" xmlns="" r:embed="rId48"/>
               </a:ext>
             </a:extLst>
           </a:blip>
@@ -4993,7 +4993,7 @@
           <a:blip r:embed="rId49">
             <a:extLst>
               <a:ext uri="{96DAC541-7B7A-43D3-8B79-37D633B846F1}">
-                <asvg:svgBlip xmlns="" xmlns:asvg="http://schemas.microsoft.com/office/drawing/2016/SVG/main" r:embed="rId29"/>
+                <asvg:svgBlip xmlns:asvg="http://schemas.microsoft.com/office/drawing/2016/SVG/main" xmlns="" r:embed="rId29"/>
               </a:ext>
             </a:extLst>
           </a:blip>
@@ -5029,7 +5029,7 @@
           <a:blip r:embed="rId50">
             <a:extLst>
               <a:ext uri="{96DAC541-7B7A-43D3-8B79-37D633B846F1}">
-                <asvg:svgBlip xmlns="" xmlns:asvg="http://schemas.microsoft.com/office/drawing/2016/SVG/main" r:embed="rId31"/>
+                <asvg:svgBlip xmlns:asvg="http://schemas.microsoft.com/office/drawing/2016/SVG/main" xmlns="" r:embed="rId31"/>
               </a:ext>
             </a:extLst>
           </a:blip>
@@ -5278,7 +5278,7 @@
           <a:blip r:embed="rId49">
             <a:extLst>
               <a:ext uri="{96DAC541-7B7A-43D3-8B79-37D633B846F1}">
-                <asvg:svgBlip xmlns="" xmlns:asvg="http://schemas.microsoft.com/office/drawing/2016/SVG/main" r:embed="rId29"/>
+                <asvg:svgBlip xmlns:asvg="http://schemas.microsoft.com/office/drawing/2016/SVG/main" xmlns="" r:embed="rId29"/>
               </a:ext>
             </a:extLst>
           </a:blip>
@@ -5314,7 +5314,7 @@
           <a:blip r:embed="rId50">
             <a:extLst>
               <a:ext uri="{96DAC541-7B7A-43D3-8B79-37D633B846F1}">
-                <asvg:svgBlip xmlns="" xmlns:asvg="http://schemas.microsoft.com/office/drawing/2016/SVG/main" r:embed="rId31"/>
+                <asvg:svgBlip xmlns:asvg="http://schemas.microsoft.com/office/drawing/2016/SVG/main" xmlns="" r:embed="rId31"/>
               </a:ext>
             </a:extLst>
           </a:blip>
@@ -5716,7 +5716,7 @@
           <a:blip r:embed="rId2">
             <a:extLst>
               <a:ext uri="{96DAC541-7B7A-43D3-8B79-37D633B846F1}">
-                <asvg:svgBlip xmlns:asvg="http://schemas.microsoft.com/office/drawing/2016/SVG/main" xmlns="" r:embed="rId15"/>
+                <asvg:svgBlip xmlns="" xmlns:asvg="http://schemas.microsoft.com/office/drawing/2016/SVG/main" r:embed="rId15"/>
               </a:ext>
             </a:extLst>
           </a:blip>
@@ -5816,7 +5816,7 @@
           <a:blip r:embed="rId16">
             <a:extLst>
               <a:ext uri="{96DAC541-7B7A-43D3-8B79-37D633B846F1}">
-                <asvg:svgBlip xmlns:asvg="http://schemas.microsoft.com/office/drawing/2016/SVG/main" xmlns="" r:embed="rId37"/>
+                <asvg:svgBlip xmlns="" xmlns:asvg="http://schemas.microsoft.com/office/drawing/2016/SVG/main" r:embed="rId37"/>
               </a:ext>
             </a:extLst>
           </a:blip>
@@ -5957,7 +5957,7 @@
           <a:blip r:embed="rId38">
             <a:extLst>
               <a:ext uri="{96DAC541-7B7A-43D3-8B79-37D633B846F1}">
-                <asvg:svgBlip xmlns:asvg="http://schemas.microsoft.com/office/drawing/2016/SVG/main" xmlns="" r:embed="rId9"/>
+                <asvg:svgBlip xmlns="" xmlns:asvg="http://schemas.microsoft.com/office/drawing/2016/SVG/main" r:embed="rId9"/>
               </a:ext>
             </a:extLst>
           </a:blip>
@@ -6049,7 +6049,7 @@
           <a:blip r:embed="rId38">
             <a:extLst>
               <a:ext uri="{96DAC541-7B7A-43D3-8B79-37D633B846F1}">
-                <asvg:svgBlip xmlns:asvg="http://schemas.microsoft.com/office/drawing/2016/SVG/main" xmlns="" r:embed="rId9"/>
+                <asvg:svgBlip xmlns="" xmlns:asvg="http://schemas.microsoft.com/office/drawing/2016/SVG/main" r:embed="rId9"/>
               </a:ext>
             </a:extLst>
           </a:blip>
@@ -6157,7 +6157,7 @@
           <a:blip r:embed="rId39">
             <a:extLst>
               <a:ext uri="{96DAC541-7B7A-43D3-8B79-37D633B846F1}">
-                <asvg:svgBlip xmlns:asvg="http://schemas.microsoft.com/office/drawing/2016/SVG/main" xmlns="" r:embed="rId11"/>
+                <asvg:svgBlip xmlns="" xmlns:asvg="http://schemas.microsoft.com/office/drawing/2016/SVG/main" r:embed="rId11"/>
               </a:ext>
             </a:extLst>
           </a:blip>
@@ -6193,7 +6193,7 @@
           <a:blip r:embed="rId40">
             <a:extLst>
               <a:ext uri="{96DAC541-7B7A-43D3-8B79-37D633B846F1}">
-                <asvg:svgBlip xmlns:asvg="http://schemas.microsoft.com/office/drawing/2016/SVG/main" xmlns="" r:embed="rId6"/>
+                <asvg:svgBlip xmlns="" xmlns:asvg="http://schemas.microsoft.com/office/drawing/2016/SVG/main" r:embed="rId6"/>
               </a:ext>
             </a:extLst>
           </a:blip>
@@ -6372,7 +6372,7 @@
           <a:blip r:embed="rId41">
             <a:extLst>
               <a:ext uri="{96DAC541-7B7A-43D3-8B79-37D633B846F1}">
-                <asvg:svgBlip xmlns:asvg="http://schemas.microsoft.com/office/drawing/2016/SVG/main" xmlns="" r:embed="rId5"/>
+                <asvg:svgBlip xmlns="" xmlns:asvg="http://schemas.microsoft.com/office/drawing/2016/SVG/main" r:embed="rId5"/>
               </a:ext>
             </a:extLst>
           </a:blip>
@@ -6491,7 +6491,7 @@
           <a:blip r:embed="rId42">
             <a:extLst>
               <a:ext uri="{96DAC541-7B7A-43D3-8B79-37D633B846F1}">
-                <asvg:svgBlip xmlns:asvg="http://schemas.microsoft.com/office/drawing/2016/SVG/main" xmlns="" r:embed="rId25"/>
+                <asvg:svgBlip xmlns="" xmlns:asvg="http://schemas.microsoft.com/office/drawing/2016/SVG/main" r:embed="rId25"/>
               </a:ext>
             </a:extLst>
           </a:blip>
@@ -6563,7 +6563,7 @@
           <a:blip r:embed="rId42">
             <a:extLst>
               <a:ext uri="{96DAC541-7B7A-43D3-8B79-37D633B846F1}">
-                <asvg:svgBlip xmlns:asvg="http://schemas.microsoft.com/office/drawing/2016/SVG/main" xmlns="" r:embed="rId25"/>
+                <asvg:svgBlip xmlns="" xmlns:asvg="http://schemas.microsoft.com/office/drawing/2016/SVG/main" r:embed="rId25"/>
               </a:ext>
             </a:extLst>
           </a:blip>
@@ -6731,7 +6731,7 @@
           <a:blip r:embed="rId43">
             <a:extLst>
               <a:ext uri="{96DAC541-7B7A-43D3-8B79-37D633B846F1}">
-                <asvg:svgBlip xmlns:asvg="http://schemas.microsoft.com/office/drawing/2016/SVG/main" xmlns="" r:embed="rId17"/>
+                <asvg:svgBlip xmlns="" xmlns:asvg="http://schemas.microsoft.com/office/drawing/2016/SVG/main" r:embed="rId17"/>
               </a:ext>
             </a:extLst>
           </a:blip>
@@ -6940,7 +6940,7 @@
           <a:blip r:embed="rId47">
             <a:extLst>
               <a:ext uri="{96DAC541-7B7A-43D3-8B79-37D633B846F1}">
-                <asvg:svgBlip xmlns="" xmlns:asvg="http://schemas.microsoft.com/office/drawing/2016/SVG/main" r:embed="rId48"/>
+                <asvg:svgBlip xmlns:asvg="http://schemas.microsoft.com/office/drawing/2016/SVG/main" xmlns="" r:embed="rId48"/>
               </a:ext>
             </a:extLst>
           </a:blip>
@@ -7094,7 +7094,7 @@
           <a:blip r:embed="rId49">
             <a:extLst>
               <a:ext uri="{96DAC541-7B7A-43D3-8B79-37D633B846F1}">
-                <asvg:svgBlip xmlns="" xmlns:asvg="http://schemas.microsoft.com/office/drawing/2016/SVG/main" r:embed="rId29"/>
+                <asvg:svgBlip xmlns:asvg="http://schemas.microsoft.com/office/drawing/2016/SVG/main" xmlns="" r:embed="rId29"/>
               </a:ext>
             </a:extLst>
           </a:blip>
@@ -7130,7 +7130,7 @@
           <a:blip r:embed="rId50">
             <a:extLst>
               <a:ext uri="{96DAC541-7B7A-43D3-8B79-37D633B846F1}">
-                <asvg:svgBlip xmlns="" xmlns:asvg="http://schemas.microsoft.com/office/drawing/2016/SVG/main" r:embed="rId31"/>
+                <asvg:svgBlip xmlns:asvg="http://schemas.microsoft.com/office/drawing/2016/SVG/main" xmlns="" r:embed="rId31"/>
               </a:ext>
             </a:extLst>
           </a:blip>
@@ -7379,7 +7379,7 @@
           <a:blip r:embed="rId49">
             <a:extLst>
               <a:ext uri="{96DAC541-7B7A-43D3-8B79-37D633B846F1}">
-                <asvg:svgBlip xmlns="" xmlns:asvg="http://schemas.microsoft.com/office/drawing/2016/SVG/main" r:embed="rId29"/>
+                <asvg:svgBlip xmlns:asvg="http://schemas.microsoft.com/office/drawing/2016/SVG/main" xmlns="" r:embed="rId29"/>
               </a:ext>
             </a:extLst>
           </a:blip>
@@ -7415,7 +7415,7 @@
           <a:blip r:embed="rId50">
             <a:extLst>
               <a:ext uri="{96DAC541-7B7A-43D3-8B79-37D633B846F1}">
-                <asvg:svgBlip xmlns="" xmlns:asvg="http://schemas.microsoft.com/office/drawing/2016/SVG/main" r:embed="rId31"/>
+                <asvg:svgBlip xmlns:asvg="http://schemas.microsoft.com/office/drawing/2016/SVG/main" xmlns="" r:embed="rId31"/>
               </a:ext>
             </a:extLst>
           </a:blip>
@@ -7683,11 +7683,7 @@
           <a:p>
             <a:r>
               <a:rPr lang="en-US" sz="1200" b="1" dirty="0" smtClean="0"/>
-              <a:t>If the resource-based policy has sufficient privilege, then the AWS Lambda function </a:t>
-            </a:r>
-            <a:r>
-              <a:rPr lang="en-US" sz="1200" b="1" dirty="0" smtClean="0"/>
-              <a:t>executes itself.</a:t>
+              <a:t>If the resource-based policy has sufficient privilege, then the AWS Lambda function executes itself.</a:t>
             </a:r>
             <a:endParaRPr lang="en-US" sz="1200" b="1" dirty="0"/>
           </a:p>
@@ -8079,7 +8075,7 @@
           <a:blip r:embed="rId2">
             <a:extLst>
               <a:ext uri="{96DAC541-7B7A-43D3-8B79-37D633B846F1}">
-                <asvg:svgBlip xmlns:asvg="http://schemas.microsoft.com/office/drawing/2016/SVG/main" xmlns="" r:embed="rId15"/>
+                <asvg:svgBlip xmlns="" xmlns:asvg="http://schemas.microsoft.com/office/drawing/2016/SVG/main" r:embed="rId15"/>
               </a:ext>
             </a:extLst>
           </a:blip>
@@ -8179,7 +8175,7 @@
           <a:blip r:embed="rId16">
             <a:extLst>
               <a:ext uri="{96DAC541-7B7A-43D3-8B79-37D633B846F1}">
-                <asvg:svgBlip xmlns:asvg="http://schemas.microsoft.com/office/drawing/2016/SVG/main" xmlns="" r:embed="rId37"/>
+                <asvg:svgBlip xmlns="" xmlns:asvg="http://schemas.microsoft.com/office/drawing/2016/SVG/main" r:embed="rId37"/>
               </a:ext>
             </a:extLst>
           </a:blip>
@@ -8320,7 +8316,7 @@
           <a:blip r:embed="rId38">
             <a:extLst>
               <a:ext uri="{96DAC541-7B7A-43D3-8B79-37D633B846F1}">
-                <asvg:svgBlip xmlns:asvg="http://schemas.microsoft.com/office/drawing/2016/SVG/main" xmlns="" r:embed="rId9"/>
+                <asvg:svgBlip xmlns="" xmlns:asvg="http://schemas.microsoft.com/office/drawing/2016/SVG/main" r:embed="rId9"/>
               </a:ext>
             </a:extLst>
           </a:blip>
@@ -8412,7 +8408,7 @@
           <a:blip r:embed="rId38">
             <a:extLst>
               <a:ext uri="{96DAC541-7B7A-43D3-8B79-37D633B846F1}">
-                <asvg:svgBlip xmlns:asvg="http://schemas.microsoft.com/office/drawing/2016/SVG/main" xmlns="" r:embed="rId9"/>
+                <asvg:svgBlip xmlns="" xmlns:asvg="http://schemas.microsoft.com/office/drawing/2016/SVG/main" r:embed="rId9"/>
               </a:ext>
             </a:extLst>
           </a:blip>
@@ -8520,7 +8516,7 @@
           <a:blip r:embed="rId39">
             <a:extLst>
               <a:ext uri="{96DAC541-7B7A-43D3-8B79-37D633B846F1}">
-                <asvg:svgBlip xmlns:asvg="http://schemas.microsoft.com/office/drawing/2016/SVG/main" xmlns="" r:embed="rId11"/>
+                <asvg:svgBlip xmlns="" xmlns:asvg="http://schemas.microsoft.com/office/drawing/2016/SVG/main" r:embed="rId11"/>
               </a:ext>
             </a:extLst>
           </a:blip>
@@ -8556,7 +8552,7 @@
           <a:blip r:embed="rId40">
             <a:extLst>
               <a:ext uri="{96DAC541-7B7A-43D3-8B79-37D633B846F1}">
-                <asvg:svgBlip xmlns:asvg="http://schemas.microsoft.com/office/drawing/2016/SVG/main" xmlns="" r:embed="rId6"/>
+                <asvg:svgBlip xmlns="" xmlns:asvg="http://schemas.microsoft.com/office/drawing/2016/SVG/main" r:embed="rId6"/>
               </a:ext>
             </a:extLst>
           </a:blip>
@@ -8735,7 +8731,7 @@
           <a:blip r:embed="rId41">
             <a:extLst>
               <a:ext uri="{96DAC541-7B7A-43D3-8B79-37D633B846F1}">
-                <asvg:svgBlip xmlns:asvg="http://schemas.microsoft.com/office/drawing/2016/SVG/main" xmlns="" r:embed="rId5"/>
+                <asvg:svgBlip xmlns="" xmlns:asvg="http://schemas.microsoft.com/office/drawing/2016/SVG/main" r:embed="rId5"/>
               </a:ext>
             </a:extLst>
           </a:blip>
@@ -8854,7 +8850,7 @@
           <a:blip r:embed="rId42">
             <a:extLst>
               <a:ext uri="{96DAC541-7B7A-43D3-8B79-37D633B846F1}">
-                <asvg:svgBlip xmlns:asvg="http://schemas.microsoft.com/office/drawing/2016/SVG/main" xmlns="" r:embed="rId25"/>
+                <asvg:svgBlip xmlns="" xmlns:asvg="http://schemas.microsoft.com/office/drawing/2016/SVG/main" r:embed="rId25"/>
               </a:ext>
             </a:extLst>
           </a:blip>
@@ -8926,7 +8922,7 @@
           <a:blip r:embed="rId42">
             <a:extLst>
               <a:ext uri="{96DAC541-7B7A-43D3-8B79-37D633B846F1}">
-                <asvg:svgBlip xmlns:asvg="http://schemas.microsoft.com/office/drawing/2016/SVG/main" xmlns="" r:embed="rId25"/>
+                <asvg:svgBlip xmlns="" xmlns:asvg="http://schemas.microsoft.com/office/drawing/2016/SVG/main" r:embed="rId25"/>
               </a:ext>
             </a:extLst>
           </a:blip>
@@ -9094,7 +9090,7 @@
           <a:blip r:embed="rId43">
             <a:extLst>
               <a:ext uri="{96DAC541-7B7A-43D3-8B79-37D633B846F1}">
-                <asvg:svgBlip xmlns:asvg="http://schemas.microsoft.com/office/drawing/2016/SVG/main" xmlns="" r:embed="rId17"/>
+                <asvg:svgBlip xmlns="" xmlns:asvg="http://schemas.microsoft.com/office/drawing/2016/SVG/main" r:embed="rId17"/>
               </a:ext>
             </a:extLst>
           </a:blip>
@@ -9303,7 +9299,7 @@
           <a:blip r:embed="rId47">
             <a:extLst>
               <a:ext uri="{96DAC541-7B7A-43D3-8B79-37D633B846F1}">
-                <asvg:svgBlip xmlns="" xmlns:asvg="http://schemas.microsoft.com/office/drawing/2016/SVG/main" r:embed="rId48"/>
+                <asvg:svgBlip xmlns:asvg="http://schemas.microsoft.com/office/drawing/2016/SVG/main" xmlns="" r:embed="rId48"/>
               </a:ext>
             </a:extLst>
           </a:blip>
@@ -9457,7 +9453,7 @@
           <a:blip r:embed="rId49">
             <a:extLst>
               <a:ext uri="{96DAC541-7B7A-43D3-8B79-37D633B846F1}">
-                <asvg:svgBlip xmlns="" xmlns:asvg="http://schemas.microsoft.com/office/drawing/2016/SVG/main" r:embed="rId29"/>
+                <asvg:svgBlip xmlns:asvg="http://schemas.microsoft.com/office/drawing/2016/SVG/main" xmlns="" r:embed="rId29"/>
               </a:ext>
             </a:extLst>
           </a:blip>
@@ -9493,7 +9489,7 @@
           <a:blip r:embed="rId50">
             <a:extLst>
               <a:ext uri="{96DAC541-7B7A-43D3-8B79-37D633B846F1}">
-                <asvg:svgBlip xmlns="" xmlns:asvg="http://schemas.microsoft.com/office/drawing/2016/SVG/main" r:embed="rId31"/>
+                <asvg:svgBlip xmlns:asvg="http://schemas.microsoft.com/office/drawing/2016/SVG/main" xmlns="" r:embed="rId31"/>
               </a:ext>
             </a:extLst>
           </a:blip>
@@ -9742,7 +9738,7 @@
           <a:blip r:embed="rId49">
             <a:extLst>
               <a:ext uri="{96DAC541-7B7A-43D3-8B79-37D633B846F1}">
-                <asvg:svgBlip xmlns="" xmlns:asvg="http://schemas.microsoft.com/office/drawing/2016/SVG/main" r:embed="rId29"/>
+                <asvg:svgBlip xmlns:asvg="http://schemas.microsoft.com/office/drawing/2016/SVG/main" xmlns="" r:embed="rId29"/>
               </a:ext>
             </a:extLst>
           </a:blip>
@@ -9778,7 +9774,7 @@
           <a:blip r:embed="rId50">
             <a:extLst>
               <a:ext uri="{96DAC541-7B7A-43D3-8B79-37D633B846F1}">
-                <asvg:svgBlip xmlns="" xmlns:asvg="http://schemas.microsoft.com/office/drawing/2016/SVG/main" r:embed="rId31"/>
+                <asvg:svgBlip xmlns:asvg="http://schemas.microsoft.com/office/drawing/2016/SVG/main" xmlns="" r:embed="rId31"/>
               </a:ext>
             </a:extLst>
           </a:blip>
@@ -10006,7 +10002,15 @@
           <a:p>
             <a:r>
               <a:rPr lang="en-US" sz="1600" u="sng" dirty="0" smtClean="0"/>
-              <a:t>Step.6 The AWS Lambda function access to other AWS resources such as </a:t>
+              <a:t>Step.6 The AWS Lambda function access to other AWS </a:t>
+            </a:r>
+            <a:r>
+              <a:rPr lang="en-US" sz="1600" u="sng" dirty="0" smtClean="0"/>
+              <a:t>services </a:t>
+            </a:r>
+            <a:r>
+              <a:rPr lang="en-US" sz="1600" u="sng" dirty="0" smtClean="0"/>
+              <a:t>such as </a:t>
             </a:r>
             <a:r>
               <a:rPr lang="en-US" sz="1600" u="sng" dirty="0" err="1" smtClean="0"/>
@@ -10028,8 +10032,8 @@
         </p:nvSpPr>
         <p:spPr>
           <a:xfrm>
-            <a:off x="7859674" y="2606505"/>
-            <a:ext cx="3202391" cy="1200329"/>
+            <a:off x="7859674" y="2223421"/>
+            <a:ext cx="3202391" cy="1569660"/>
           </a:xfrm>
           <a:prstGeom prst="rect">
             <a:avLst/>
@@ -10055,7 +10059,15 @@
           <a:p>
             <a:r>
               <a:rPr lang="en-US" sz="1200" b="1" dirty="0" smtClean="0"/>
-              <a:t>6-1. The Lambda function invokes other AWS service APIs with IAM Permissions belongs to the IAM Role attached to the AWS Lambda. </a:t>
+              <a:t>6-1. The Lambda function invokes other AWS service APIs with IAM Permissions </a:t>
+            </a:r>
+            <a:r>
+              <a:rPr lang="en-US" sz="1200" b="1" dirty="0" smtClean="0"/>
+              <a:t>attached </a:t>
+            </a:r>
+            <a:r>
+              <a:rPr lang="en-US" sz="1200" b="1" dirty="0" smtClean="0"/>
+              <a:t>to the AWS Lambda. </a:t>
             </a:r>
             <a:r>
               <a:rPr lang="en-US" sz="1200" b="1" dirty="0" smtClean="0">
@@ -10079,7 +10091,23 @@
                   <a:srgbClr val="FF0000"/>
                 </a:solidFill>
               </a:rPr>
-              <a:t> Identity Pool never affects the authorization here.</a:t>
+              <a:t> Identity Pool </a:t>
+            </a:r>
+            <a:r>
+              <a:rPr lang="en-US" sz="1200" b="1" dirty="0" smtClean="0">
+                <a:solidFill>
+                  <a:srgbClr val="FF0000"/>
+                </a:solidFill>
+              </a:rPr>
+              <a:t>(i.e. the permissions of the Authenticated Role associated to your Identity Pool)never </a:t>
+            </a:r>
+            <a:r>
+              <a:rPr lang="en-US" sz="1200" b="1" dirty="0" smtClean="0">
+                <a:solidFill>
+                  <a:srgbClr val="FF0000"/>
+                </a:solidFill>
+              </a:rPr>
+              <a:t>affects the authorization here.</a:t>
             </a:r>
             <a:endParaRPr lang="en-US" sz="1200" b="1" dirty="0">
               <a:solidFill>
@@ -10475,7 +10503,7 @@
           <a:blip r:embed="rId2">
             <a:extLst>
               <a:ext uri="{96DAC541-7B7A-43D3-8B79-37D633B846F1}">
-                <asvg:svgBlip xmlns:asvg="http://schemas.microsoft.com/office/drawing/2016/SVG/main" xmlns="" r:embed="rId15"/>
+                <asvg:svgBlip xmlns="" xmlns:asvg="http://schemas.microsoft.com/office/drawing/2016/SVG/main" r:embed="rId15"/>
               </a:ext>
             </a:extLst>
           </a:blip>
@@ -10575,7 +10603,7 @@
           <a:blip r:embed="rId16">
             <a:extLst>
               <a:ext uri="{96DAC541-7B7A-43D3-8B79-37D633B846F1}">
-                <asvg:svgBlip xmlns:asvg="http://schemas.microsoft.com/office/drawing/2016/SVG/main" xmlns="" r:embed="rId37"/>
+                <asvg:svgBlip xmlns="" xmlns:asvg="http://schemas.microsoft.com/office/drawing/2016/SVG/main" r:embed="rId37"/>
               </a:ext>
             </a:extLst>
           </a:blip>
@@ -10716,7 +10744,7 @@
           <a:blip r:embed="rId38">
             <a:extLst>
               <a:ext uri="{96DAC541-7B7A-43D3-8B79-37D633B846F1}">
-                <asvg:svgBlip xmlns:asvg="http://schemas.microsoft.com/office/drawing/2016/SVG/main" xmlns="" r:embed="rId9"/>
+                <asvg:svgBlip xmlns="" xmlns:asvg="http://schemas.microsoft.com/office/drawing/2016/SVG/main" r:embed="rId9"/>
               </a:ext>
             </a:extLst>
           </a:blip>
@@ -10808,7 +10836,7 @@
           <a:blip r:embed="rId38">
             <a:extLst>
               <a:ext uri="{96DAC541-7B7A-43D3-8B79-37D633B846F1}">
-                <asvg:svgBlip xmlns:asvg="http://schemas.microsoft.com/office/drawing/2016/SVG/main" xmlns="" r:embed="rId9"/>
+                <asvg:svgBlip xmlns="" xmlns:asvg="http://schemas.microsoft.com/office/drawing/2016/SVG/main" r:embed="rId9"/>
               </a:ext>
             </a:extLst>
           </a:blip>
@@ -10916,7 +10944,7 @@
           <a:blip r:embed="rId39">
             <a:extLst>
               <a:ext uri="{96DAC541-7B7A-43D3-8B79-37D633B846F1}">
-                <asvg:svgBlip xmlns:asvg="http://schemas.microsoft.com/office/drawing/2016/SVG/main" xmlns="" r:embed="rId11"/>
+                <asvg:svgBlip xmlns="" xmlns:asvg="http://schemas.microsoft.com/office/drawing/2016/SVG/main" r:embed="rId11"/>
               </a:ext>
             </a:extLst>
           </a:blip>
@@ -10952,7 +10980,7 @@
           <a:blip r:embed="rId40">
             <a:extLst>
               <a:ext uri="{96DAC541-7B7A-43D3-8B79-37D633B846F1}">
-                <asvg:svgBlip xmlns:asvg="http://schemas.microsoft.com/office/drawing/2016/SVG/main" xmlns="" r:embed="rId6"/>
+                <asvg:svgBlip xmlns="" xmlns:asvg="http://schemas.microsoft.com/office/drawing/2016/SVG/main" r:embed="rId6"/>
               </a:ext>
             </a:extLst>
           </a:blip>
@@ -11131,7 +11159,7 @@
           <a:blip r:embed="rId41">
             <a:extLst>
               <a:ext uri="{96DAC541-7B7A-43D3-8B79-37D633B846F1}">
-                <asvg:svgBlip xmlns:asvg="http://schemas.microsoft.com/office/drawing/2016/SVG/main" xmlns="" r:embed="rId5"/>
+                <asvg:svgBlip xmlns="" xmlns:asvg="http://schemas.microsoft.com/office/drawing/2016/SVG/main" r:embed="rId5"/>
               </a:ext>
             </a:extLst>
           </a:blip>
@@ -11250,7 +11278,7 @@
           <a:blip r:embed="rId42">
             <a:extLst>
               <a:ext uri="{96DAC541-7B7A-43D3-8B79-37D633B846F1}">
-                <asvg:svgBlip xmlns:asvg="http://schemas.microsoft.com/office/drawing/2016/SVG/main" xmlns="" r:embed="rId25"/>
+                <asvg:svgBlip xmlns="" xmlns:asvg="http://schemas.microsoft.com/office/drawing/2016/SVG/main" r:embed="rId25"/>
               </a:ext>
             </a:extLst>
           </a:blip>
@@ -11322,7 +11350,7 @@
           <a:blip r:embed="rId42">
             <a:extLst>
               <a:ext uri="{96DAC541-7B7A-43D3-8B79-37D633B846F1}">
-                <asvg:svgBlip xmlns:asvg="http://schemas.microsoft.com/office/drawing/2016/SVG/main" xmlns="" r:embed="rId25"/>
+                <asvg:svgBlip xmlns="" xmlns:asvg="http://schemas.microsoft.com/office/drawing/2016/SVG/main" r:embed="rId25"/>
               </a:ext>
             </a:extLst>
           </a:blip>
@@ -11490,7 +11518,7 @@
           <a:blip r:embed="rId43">
             <a:extLst>
               <a:ext uri="{96DAC541-7B7A-43D3-8B79-37D633B846F1}">
-                <asvg:svgBlip xmlns:asvg="http://schemas.microsoft.com/office/drawing/2016/SVG/main" xmlns="" r:embed="rId17"/>
+                <asvg:svgBlip xmlns="" xmlns:asvg="http://schemas.microsoft.com/office/drawing/2016/SVG/main" r:embed="rId17"/>
               </a:ext>
             </a:extLst>
           </a:blip>
@@ -11699,7 +11727,7 @@
           <a:blip r:embed="rId47">
             <a:extLst>
               <a:ext uri="{96DAC541-7B7A-43D3-8B79-37D633B846F1}">
-                <asvg:svgBlip xmlns="" xmlns:asvg="http://schemas.microsoft.com/office/drawing/2016/SVG/main" r:embed="rId48"/>
+                <asvg:svgBlip xmlns:asvg="http://schemas.microsoft.com/office/drawing/2016/SVG/main" xmlns="" r:embed="rId48"/>
               </a:ext>
             </a:extLst>
           </a:blip>
@@ -11853,7 +11881,7 @@
           <a:blip r:embed="rId49">
             <a:extLst>
               <a:ext uri="{96DAC541-7B7A-43D3-8B79-37D633B846F1}">
-                <asvg:svgBlip xmlns="" xmlns:asvg="http://schemas.microsoft.com/office/drawing/2016/SVG/main" r:embed="rId29"/>
+                <asvg:svgBlip xmlns:asvg="http://schemas.microsoft.com/office/drawing/2016/SVG/main" xmlns="" r:embed="rId29"/>
               </a:ext>
             </a:extLst>
           </a:blip>
@@ -11889,7 +11917,7 @@
           <a:blip r:embed="rId50">
             <a:extLst>
               <a:ext uri="{96DAC541-7B7A-43D3-8B79-37D633B846F1}">
-                <asvg:svgBlip xmlns="" xmlns:asvg="http://schemas.microsoft.com/office/drawing/2016/SVG/main" r:embed="rId31"/>
+                <asvg:svgBlip xmlns:asvg="http://schemas.microsoft.com/office/drawing/2016/SVG/main" xmlns="" r:embed="rId31"/>
               </a:ext>
             </a:extLst>
           </a:blip>
@@ -12138,7 +12166,7 @@
           <a:blip r:embed="rId49">
             <a:extLst>
               <a:ext uri="{96DAC541-7B7A-43D3-8B79-37D633B846F1}">
-                <asvg:svgBlip xmlns="" xmlns:asvg="http://schemas.microsoft.com/office/drawing/2016/SVG/main" r:embed="rId29"/>
+                <asvg:svgBlip xmlns:asvg="http://schemas.microsoft.com/office/drawing/2016/SVG/main" xmlns="" r:embed="rId29"/>
               </a:ext>
             </a:extLst>
           </a:blip>
@@ -12174,7 +12202,7 @@
           <a:blip r:embed="rId50">
             <a:extLst>
               <a:ext uri="{96DAC541-7B7A-43D3-8B79-37D633B846F1}">
-                <asvg:svgBlip xmlns="" xmlns:asvg="http://schemas.microsoft.com/office/drawing/2016/SVG/main" r:embed="rId31"/>
+                <asvg:svgBlip xmlns:asvg="http://schemas.microsoft.com/office/drawing/2016/SVG/main" xmlns="" r:embed="rId31"/>
               </a:ext>
             </a:extLst>
           </a:blip>
@@ -12262,11 +12290,7 @@
           <a:p>
             <a:r>
               <a:rPr lang="en-US" sz="1600" u="sng" dirty="0" smtClean="0"/>
-              <a:t>Step.7 </a:t>
-            </a:r>
-            <a:r>
-              <a:rPr lang="en-US" sz="1600" u="sng" dirty="0" smtClean="0"/>
-              <a:t>Receive a response from the AWS Lambda function.</a:t>
+              <a:t>Step.7 Receive a response from the AWS Lambda function.</a:t>
             </a:r>
             <a:endParaRPr lang="en-US" sz="1600" u="sng" dirty="0"/>
           </a:p>
@@ -12353,11 +12377,7 @@
           <a:p>
             <a:r>
               <a:rPr lang="en-US" sz="1200" b="1" dirty="0" smtClean="0"/>
-              <a:t>7. </a:t>
-            </a:r>
-            <a:r>
-              <a:rPr lang="en-US" sz="1200" b="1" dirty="0" smtClean="0"/>
-              <a:t>The API Gateway receives a response from the AWS Lambda function.</a:t>
+              <a:t>7. The API Gateway receives a response from the AWS Lambda function.</a:t>
             </a:r>
             <a:endParaRPr lang="en-US" sz="1200" b="1" dirty="0"/>
           </a:p>
@@ -12795,7 +12815,7 @@
           <a:blip r:embed="rId2">
             <a:extLst>
               <a:ext uri="{96DAC541-7B7A-43D3-8B79-37D633B846F1}">
-                <asvg:svgBlip xmlns:asvg="http://schemas.microsoft.com/office/drawing/2016/SVG/main" xmlns="" r:embed="rId15"/>
+                <asvg:svgBlip xmlns="" xmlns:asvg="http://schemas.microsoft.com/office/drawing/2016/SVG/main" r:embed="rId15"/>
               </a:ext>
             </a:extLst>
           </a:blip>
@@ -12895,7 +12915,7 @@
           <a:blip r:embed="rId16">
             <a:extLst>
               <a:ext uri="{96DAC541-7B7A-43D3-8B79-37D633B846F1}">
-                <asvg:svgBlip xmlns:asvg="http://schemas.microsoft.com/office/drawing/2016/SVG/main" xmlns="" r:embed="rId37"/>
+                <asvg:svgBlip xmlns="" xmlns:asvg="http://schemas.microsoft.com/office/drawing/2016/SVG/main" r:embed="rId37"/>
               </a:ext>
             </a:extLst>
           </a:blip>
@@ -13036,7 +13056,7 @@
           <a:blip r:embed="rId38">
             <a:extLst>
               <a:ext uri="{96DAC541-7B7A-43D3-8B79-37D633B846F1}">
-                <asvg:svgBlip xmlns:asvg="http://schemas.microsoft.com/office/drawing/2016/SVG/main" xmlns="" r:embed="rId9"/>
+                <asvg:svgBlip xmlns="" xmlns:asvg="http://schemas.microsoft.com/office/drawing/2016/SVG/main" r:embed="rId9"/>
               </a:ext>
             </a:extLst>
           </a:blip>
@@ -13128,7 +13148,7 @@
           <a:blip r:embed="rId38">
             <a:extLst>
               <a:ext uri="{96DAC541-7B7A-43D3-8B79-37D633B846F1}">
-                <asvg:svgBlip xmlns:asvg="http://schemas.microsoft.com/office/drawing/2016/SVG/main" xmlns="" r:embed="rId9"/>
+                <asvg:svgBlip xmlns="" xmlns:asvg="http://schemas.microsoft.com/office/drawing/2016/SVG/main" r:embed="rId9"/>
               </a:ext>
             </a:extLst>
           </a:blip>
@@ -13236,7 +13256,7 @@
           <a:blip r:embed="rId39">
             <a:extLst>
               <a:ext uri="{96DAC541-7B7A-43D3-8B79-37D633B846F1}">
-                <asvg:svgBlip xmlns:asvg="http://schemas.microsoft.com/office/drawing/2016/SVG/main" xmlns="" r:embed="rId11"/>
+                <asvg:svgBlip xmlns="" xmlns:asvg="http://schemas.microsoft.com/office/drawing/2016/SVG/main" r:embed="rId11"/>
               </a:ext>
             </a:extLst>
           </a:blip>
@@ -13272,7 +13292,7 @@
           <a:blip r:embed="rId40">
             <a:extLst>
               <a:ext uri="{96DAC541-7B7A-43D3-8B79-37D633B846F1}">
-                <asvg:svgBlip xmlns:asvg="http://schemas.microsoft.com/office/drawing/2016/SVG/main" xmlns="" r:embed="rId6"/>
+                <asvg:svgBlip xmlns="" xmlns:asvg="http://schemas.microsoft.com/office/drawing/2016/SVG/main" r:embed="rId6"/>
               </a:ext>
             </a:extLst>
           </a:blip>
@@ -13451,7 +13471,7 @@
           <a:blip r:embed="rId41">
             <a:extLst>
               <a:ext uri="{96DAC541-7B7A-43D3-8B79-37D633B846F1}">
-                <asvg:svgBlip xmlns:asvg="http://schemas.microsoft.com/office/drawing/2016/SVG/main" xmlns="" r:embed="rId5"/>
+                <asvg:svgBlip xmlns="" xmlns:asvg="http://schemas.microsoft.com/office/drawing/2016/SVG/main" r:embed="rId5"/>
               </a:ext>
             </a:extLst>
           </a:blip>
@@ -13570,7 +13590,7 @@
           <a:blip r:embed="rId42">
             <a:extLst>
               <a:ext uri="{96DAC541-7B7A-43D3-8B79-37D633B846F1}">
-                <asvg:svgBlip xmlns:asvg="http://schemas.microsoft.com/office/drawing/2016/SVG/main" xmlns="" r:embed="rId25"/>
+                <asvg:svgBlip xmlns="" xmlns:asvg="http://schemas.microsoft.com/office/drawing/2016/SVG/main" r:embed="rId25"/>
               </a:ext>
             </a:extLst>
           </a:blip>
@@ -13642,7 +13662,7 @@
           <a:blip r:embed="rId42">
             <a:extLst>
               <a:ext uri="{96DAC541-7B7A-43D3-8B79-37D633B846F1}">
-                <asvg:svgBlip xmlns:asvg="http://schemas.microsoft.com/office/drawing/2016/SVG/main" xmlns="" r:embed="rId25"/>
+                <asvg:svgBlip xmlns="" xmlns:asvg="http://schemas.microsoft.com/office/drawing/2016/SVG/main" r:embed="rId25"/>
               </a:ext>
             </a:extLst>
           </a:blip>
@@ -13810,7 +13830,7 @@
           <a:blip r:embed="rId43">
             <a:extLst>
               <a:ext uri="{96DAC541-7B7A-43D3-8B79-37D633B846F1}">
-                <asvg:svgBlip xmlns:asvg="http://schemas.microsoft.com/office/drawing/2016/SVG/main" xmlns="" r:embed="rId17"/>
+                <asvg:svgBlip xmlns="" xmlns:asvg="http://schemas.microsoft.com/office/drawing/2016/SVG/main" r:embed="rId17"/>
               </a:ext>
             </a:extLst>
           </a:blip>
@@ -14019,7 +14039,7 @@
           <a:blip r:embed="rId47">
             <a:extLst>
               <a:ext uri="{96DAC541-7B7A-43D3-8B79-37D633B846F1}">
-                <asvg:svgBlip xmlns="" xmlns:asvg="http://schemas.microsoft.com/office/drawing/2016/SVG/main" r:embed="rId48"/>
+                <asvg:svgBlip xmlns:asvg="http://schemas.microsoft.com/office/drawing/2016/SVG/main" xmlns="" r:embed="rId48"/>
               </a:ext>
             </a:extLst>
           </a:blip>
@@ -14173,7 +14193,7 @@
           <a:blip r:embed="rId49">
             <a:extLst>
               <a:ext uri="{96DAC541-7B7A-43D3-8B79-37D633B846F1}">
-                <asvg:svgBlip xmlns="" xmlns:asvg="http://schemas.microsoft.com/office/drawing/2016/SVG/main" r:embed="rId29"/>
+                <asvg:svgBlip xmlns:asvg="http://schemas.microsoft.com/office/drawing/2016/SVG/main" xmlns="" r:embed="rId29"/>
               </a:ext>
             </a:extLst>
           </a:blip>
@@ -14209,7 +14229,7 @@
           <a:blip r:embed="rId50">
             <a:extLst>
               <a:ext uri="{96DAC541-7B7A-43D3-8B79-37D633B846F1}">
-                <asvg:svgBlip xmlns="" xmlns:asvg="http://schemas.microsoft.com/office/drawing/2016/SVG/main" r:embed="rId31"/>
+                <asvg:svgBlip xmlns:asvg="http://schemas.microsoft.com/office/drawing/2016/SVG/main" xmlns="" r:embed="rId31"/>
               </a:ext>
             </a:extLst>
           </a:blip>
@@ -14458,7 +14478,7 @@
           <a:blip r:embed="rId49">
             <a:extLst>
               <a:ext uri="{96DAC541-7B7A-43D3-8B79-37D633B846F1}">
-                <asvg:svgBlip xmlns="" xmlns:asvg="http://schemas.microsoft.com/office/drawing/2016/SVG/main" r:embed="rId29"/>
+                <asvg:svgBlip xmlns:asvg="http://schemas.microsoft.com/office/drawing/2016/SVG/main" xmlns="" r:embed="rId29"/>
               </a:ext>
             </a:extLst>
           </a:blip>
@@ -14494,7 +14514,7 @@
           <a:blip r:embed="rId50">
             <a:extLst>
               <a:ext uri="{96DAC541-7B7A-43D3-8B79-37D633B846F1}">
-                <asvg:svgBlip xmlns="" xmlns:asvg="http://schemas.microsoft.com/office/drawing/2016/SVG/main" r:embed="rId31"/>
+                <asvg:svgBlip xmlns:asvg="http://schemas.microsoft.com/office/drawing/2016/SVG/main" xmlns="" r:embed="rId31"/>
               </a:ext>
             </a:extLst>
           </a:blip>
@@ -14737,11 +14757,7 @@
             </a:r>
             <a:r>
               <a:rPr lang="en-US" sz="1200" b="1" dirty="0" smtClean="0"/>
-              <a:t>. </a:t>
-            </a:r>
-            <a:r>
-              <a:rPr lang="en-US" sz="1200" b="1" dirty="0" smtClean="0"/>
-              <a:t>The Client app receives a response from the API Gateway.</a:t>
+              <a:t>. The Client app receives a response from the API Gateway.</a:t>
             </a:r>
             <a:endParaRPr lang="en-US" sz="1200" b="1" dirty="0"/>
           </a:p>
@@ -14771,11 +14787,7 @@
           <a:p>
             <a:r>
               <a:rPr lang="en-US" sz="1600" u="sng" dirty="0" smtClean="0"/>
-              <a:t>Step.8 </a:t>
-            </a:r>
-            <a:r>
-              <a:rPr lang="en-US" sz="1600" u="sng" dirty="0" smtClean="0"/>
-              <a:t>Receive a response from the API </a:t>
+              <a:t>Step.8 Receive a response from the API </a:t>
             </a:r>
             <a:r>
               <a:rPr lang="en-US" sz="1600" u="sng" dirty="0" err="1" smtClean="0"/>
@@ -15127,7 +15139,7 @@
           <a:blip r:embed="rId2">
             <a:extLst>
               <a:ext uri="{96DAC541-7B7A-43D3-8B79-37D633B846F1}">
-                <asvg:svgBlip xmlns:asvg="http://schemas.microsoft.com/office/drawing/2016/SVG/main" xmlns="" r:embed="rId15"/>
+                <asvg:svgBlip xmlns="" xmlns:asvg="http://schemas.microsoft.com/office/drawing/2016/SVG/main" r:embed="rId15"/>
               </a:ext>
             </a:extLst>
           </a:blip>
@@ -15227,7 +15239,7 @@
           <a:blip r:embed="rId16">
             <a:extLst>
               <a:ext uri="{96DAC541-7B7A-43D3-8B79-37D633B846F1}">
-                <asvg:svgBlip xmlns:asvg="http://schemas.microsoft.com/office/drawing/2016/SVG/main" xmlns="" r:embed="rId37"/>
+                <asvg:svgBlip xmlns="" xmlns:asvg="http://schemas.microsoft.com/office/drawing/2016/SVG/main" r:embed="rId37"/>
               </a:ext>
             </a:extLst>
           </a:blip>
@@ -15368,7 +15380,7 @@
           <a:blip r:embed="rId38">
             <a:extLst>
               <a:ext uri="{96DAC541-7B7A-43D3-8B79-37D633B846F1}">
-                <asvg:svgBlip xmlns:asvg="http://schemas.microsoft.com/office/drawing/2016/SVG/main" xmlns="" r:embed="rId9"/>
+                <asvg:svgBlip xmlns="" xmlns:asvg="http://schemas.microsoft.com/office/drawing/2016/SVG/main" r:embed="rId9"/>
               </a:ext>
             </a:extLst>
           </a:blip>
@@ -15460,7 +15472,7 @@
           <a:blip r:embed="rId38">
             <a:extLst>
               <a:ext uri="{96DAC541-7B7A-43D3-8B79-37D633B846F1}">
-                <asvg:svgBlip xmlns:asvg="http://schemas.microsoft.com/office/drawing/2016/SVG/main" xmlns="" r:embed="rId9"/>
+                <asvg:svgBlip xmlns="" xmlns:asvg="http://schemas.microsoft.com/office/drawing/2016/SVG/main" r:embed="rId9"/>
               </a:ext>
             </a:extLst>
           </a:blip>
@@ -15568,7 +15580,7 @@
           <a:blip r:embed="rId39">
             <a:extLst>
               <a:ext uri="{96DAC541-7B7A-43D3-8B79-37D633B846F1}">
-                <asvg:svgBlip xmlns:asvg="http://schemas.microsoft.com/office/drawing/2016/SVG/main" xmlns="" r:embed="rId11"/>
+                <asvg:svgBlip xmlns="" xmlns:asvg="http://schemas.microsoft.com/office/drawing/2016/SVG/main" r:embed="rId11"/>
               </a:ext>
             </a:extLst>
           </a:blip>
@@ -15604,7 +15616,7 @@
           <a:blip r:embed="rId40">
             <a:extLst>
               <a:ext uri="{96DAC541-7B7A-43D3-8B79-37D633B846F1}">
-                <asvg:svgBlip xmlns:asvg="http://schemas.microsoft.com/office/drawing/2016/SVG/main" xmlns="" r:embed="rId6"/>
+                <asvg:svgBlip xmlns="" xmlns:asvg="http://schemas.microsoft.com/office/drawing/2016/SVG/main" r:embed="rId6"/>
               </a:ext>
             </a:extLst>
           </a:blip>
@@ -15783,7 +15795,7 @@
           <a:blip r:embed="rId41">
             <a:extLst>
               <a:ext uri="{96DAC541-7B7A-43D3-8B79-37D633B846F1}">
-                <asvg:svgBlip xmlns:asvg="http://schemas.microsoft.com/office/drawing/2016/SVG/main" xmlns="" r:embed="rId5"/>
+                <asvg:svgBlip xmlns="" xmlns:asvg="http://schemas.microsoft.com/office/drawing/2016/SVG/main" r:embed="rId5"/>
               </a:ext>
             </a:extLst>
           </a:blip>
@@ -15902,7 +15914,7 @@
           <a:blip r:embed="rId42">
             <a:extLst>
               <a:ext uri="{96DAC541-7B7A-43D3-8B79-37D633B846F1}">
-                <asvg:svgBlip xmlns:asvg="http://schemas.microsoft.com/office/drawing/2016/SVG/main" xmlns="" r:embed="rId25"/>
+                <asvg:svgBlip xmlns="" xmlns:asvg="http://schemas.microsoft.com/office/drawing/2016/SVG/main" r:embed="rId25"/>
               </a:ext>
             </a:extLst>
           </a:blip>
@@ -15974,7 +15986,7 @@
           <a:blip r:embed="rId42">
             <a:extLst>
               <a:ext uri="{96DAC541-7B7A-43D3-8B79-37D633B846F1}">
-                <asvg:svgBlip xmlns:asvg="http://schemas.microsoft.com/office/drawing/2016/SVG/main" xmlns="" r:embed="rId25"/>
+                <asvg:svgBlip xmlns="" xmlns:asvg="http://schemas.microsoft.com/office/drawing/2016/SVG/main" r:embed="rId25"/>
               </a:ext>
             </a:extLst>
           </a:blip>
@@ -16142,7 +16154,7 @@
           <a:blip r:embed="rId43">
             <a:extLst>
               <a:ext uri="{96DAC541-7B7A-43D3-8B79-37D633B846F1}">
-                <asvg:svgBlip xmlns:asvg="http://schemas.microsoft.com/office/drawing/2016/SVG/main" xmlns="" r:embed="rId17"/>
+                <asvg:svgBlip xmlns="" xmlns:asvg="http://schemas.microsoft.com/office/drawing/2016/SVG/main" r:embed="rId17"/>
               </a:ext>
             </a:extLst>
           </a:blip>
@@ -16351,7 +16363,7 @@
           <a:blip r:embed="rId47">
             <a:extLst>
               <a:ext uri="{96DAC541-7B7A-43D3-8B79-37D633B846F1}">
-                <asvg:svgBlip xmlns="" xmlns:asvg="http://schemas.microsoft.com/office/drawing/2016/SVG/main" r:embed="rId48"/>
+                <asvg:svgBlip xmlns:asvg="http://schemas.microsoft.com/office/drawing/2016/SVG/main" xmlns="" r:embed="rId48"/>
               </a:ext>
             </a:extLst>
           </a:blip>
@@ -16505,7 +16517,7 @@
           <a:blip r:embed="rId49">
             <a:extLst>
               <a:ext uri="{96DAC541-7B7A-43D3-8B79-37D633B846F1}">
-                <asvg:svgBlip xmlns="" xmlns:asvg="http://schemas.microsoft.com/office/drawing/2016/SVG/main" r:embed="rId29"/>
+                <asvg:svgBlip xmlns:asvg="http://schemas.microsoft.com/office/drawing/2016/SVG/main" xmlns="" r:embed="rId29"/>
               </a:ext>
             </a:extLst>
           </a:blip>
@@ -16541,7 +16553,7 @@
           <a:blip r:embed="rId50">
             <a:extLst>
               <a:ext uri="{96DAC541-7B7A-43D3-8B79-37D633B846F1}">
-                <asvg:svgBlip xmlns="" xmlns:asvg="http://schemas.microsoft.com/office/drawing/2016/SVG/main" r:embed="rId31"/>
+                <asvg:svgBlip xmlns:asvg="http://schemas.microsoft.com/office/drawing/2016/SVG/main" xmlns="" r:embed="rId31"/>
               </a:ext>
             </a:extLst>
           </a:blip>
@@ -16790,7 +16802,7 @@
           <a:blip r:embed="rId49">
             <a:extLst>
               <a:ext uri="{96DAC541-7B7A-43D3-8B79-37D633B846F1}">
-                <asvg:svgBlip xmlns="" xmlns:asvg="http://schemas.microsoft.com/office/drawing/2016/SVG/main" r:embed="rId29"/>
+                <asvg:svgBlip xmlns:asvg="http://schemas.microsoft.com/office/drawing/2016/SVG/main" xmlns="" r:embed="rId29"/>
               </a:ext>
             </a:extLst>
           </a:blip>
@@ -16826,7 +16838,7 @@
           <a:blip r:embed="rId50">
             <a:extLst>
               <a:ext uri="{96DAC541-7B7A-43D3-8B79-37D633B846F1}">
-                <asvg:svgBlip xmlns="" xmlns:asvg="http://schemas.microsoft.com/office/drawing/2016/SVG/main" r:embed="rId31"/>
+                <asvg:svgBlip xmlns:asvg="http://schemas.microsoft.com/office/drawing/2016/SVG/main" xmlns="" r:embed="rId31"/>
               </a:ext>
             </a:extLst>
           </a:blip>
@@ -17398,7 +17410,7 @@
           <a:blip r:embed="rId2">
             <a:extLst>
               <a:ext uri="{96DAC541-7B7A-43D3-8B79-37D633B846F1}">
-                <asvg:svgBlip xmlns:asvg="http://schemas.microsoft.com/office/drawing/2016/SVG/main" xmlns="" r:embed="rId15"/>
+                <asvg:svgBlip xmlns="" xmlns:asvg="http://schemas.microsoft.com/office/drawing/2016/SVG/main" r:embed="rId15"/>
               </a:ext>
             </a:extLst>
           </a:blip>
@@ -17498,7 +17510,7 @@
           <a:blip r:embed="rId16">
             <a:extLst>
               <a:ext uri="{96DAC541-7B7A-43D3-8B79-37D633B846F1}">
-                <asvg:svgBlip xmlns:asvg="http://schemas.microsoft.com/office/drawing/2016/SVG/main" xmlns="" r:embed="rId37"/>
+                <asvg:svgBlip xmlns="" xmlns:asvg="http://schemas.microsoft.com/office/drawing/2016/SVG/main" r:embed="rId37"/>
               </a:ext>
             </a:extLst>
           </a:blip>
@@ -17639,7 +17651,7 @@
           <a:blip r:embed="rId38">
             <a:extLst>
               <a:ext uri="{96DAC541-7B7A-43D3-8B79-37D633B846F1}">
-                <asvg:svgBlip xmlns:asvg="http://schemas.microsoft.com/office/drawing/2016/SVG/main" xmlns="" r:embed="rId9"/>
+                <asvg:svgBlip xmlns="" xmlns:asvg="http://schemas.microsoft.com/office/drawing/2016/SVG/main" r:embed="rId9"/>
               </a:ext>
             </a:extLst>
           </a:blip>
@@ -17731,7 +17743,7 @@
           <a:blip r:embed="rId38">
             <a:extLst>
               <a:ext uri="{96DAC541-7B7A-43D3-8B79-37D633B846F1}">
-                <asvg:svgBlip xmlns:asvg="http://schemas.microsoft.com/office/drawing/2016/SVG/main" xmlns="" r:embed="rId9"/>
+                <asvg:svgBlip xmlns="" xmlns:asvg="http://schemas.microsoft.com/office/drawing/2016/SVG/main" r:embed="rId9"/>
               </a:ext>
             </a:extLst>
           </a:blip>
@@ -17839,7 +17851,7 @@
           <a:blip r:embed="rId39">
             <a:extLst>
               <a:ext uri="{96DAC541-7B7A-43D3-8B79-37D633B846F1}">
-                <asvg:svgBlip xmlns:asvg="http://schemas.microsoft.com/office/drawing/2016/SVG/main" xmlns="" r:embed="rId11"/>
+                <asvg:svgBlip xmlns="" xmlns:asvg="http://schemas.microsoft.com/office/drawing/2016/SVG/main" r:embed="rId11"/>
               </a:ext>
             </a:extLst>
           </a:blip>
@@ -17875,7 +17887,7 @@
           <a:blip r:embed="rId40">
             <a:extLst>
               <a:ext uri="{96DAC541-7B7A-43D3-8B79-37D633B846F1}">
-                <asvg:svgBlip xmlns:asvg="http://schemas.microsoft.com/office/drawing/2016/SVG/main" xmlns="" r:embed="rId6"/>
+                <asvg:svgBlip xmlns="" xmlns:asvg="http://schemas.microsoft.com/office/drawing/2016/SVG/main" r:embed="rId6"/>
               </a:ext>
             </a:extLst>
           </a:blip>
@@ -18054,7 +18066,7 @@
           <a:blip r:embed="rId41">
             <a:extLst>
               <a:ext uri="{96DAC541-7B7A-43D3-8B79-37D633B846F1}">
-                <asvg:svgBlip xmlns:asvg="http://schemas.microsoft.com/office/drawing/2016/SVG/main" xmlns="" r:embed="rId5"/>
+                <asvg:svgBlip xmlns="" xmlns:asvg="http://schemas.microsoft.com/office/drawing/2016/SVG/main" r:embed="rId5"/>
               </a:ext>
             </a:extLst>
           </a:blip>
@@ -18173,7 +18185,7 @@
           <a:blip r:embed="rId42">
             <a:extLst>
               <a:ext uri="{96DAC541-7B7A-43D3-8B79-37D633B846F1}">
-                <asvg:svgBlip xmlns:asvg="http://schemas.microsoft.com/office/drawing/2016/SVG/main" xmlns="" r:embed="rId25"/>
+                <asvg:svgBlip xmlns="" xmlns:asvg="http://schemas.microsoft.com/office/drawing/2016/SVG/main" r:embed="rId25"/>
               </a:ext>
             </a:extLst>
           </a:blip>
@@ -18245,7 +18257,7 @@
           <a:blip r:embed="rId42">
             <a:extLst>
               <a:ext uri="{96DAC541-7B7A-43D3-8B79-37D633B846F1}">
-                <asvg:svgBlip xmlns:asvg="http://schemas.microsoft.com/office/drawing/2016/SVG/main" xmlns="" r:embed="rId25"/>
+                <asvg:svgBlip xmlns="" xmlns:asvg="http://schemas.microsoft.com/office/drawing/2016/SVG/main" r:embed="rId25"/>
               </a:ext>
             </a:extLst>
           </a:blip>
@@ -18413,7 +18425,7 @@
           <a:blip r:embed="rId43">
             <a:extLst>
               <a:ext uri="{96DAC541-7B7A-43D3-8B79-37D633B846F1}">
-                <asvg:svgBlip xmlns:asvg="http://schemas.microsoft.com/office/drawing/2016/SVG/main" xmlns="" r:embed="rId17"/>
+                <asvg:svgBlip xmlns="" xmlns:asvg="http://schemas.microsoft.com/office/drawing/2016/SVG/main" r:embed="rId17"/>
               </a:ext>
             </a:extLst>
           </a:blip>
@@ -18622,7 +18634,7 @@
           <a:blip r:embed="rId47">
             <a:extLst>
               <a:ext uri="{96DAC541-7B7A-43D3-8B79-37D633B846F1}">
-                <asvg:svgBlip xmlns="" xmlns:asvg="http://schemas.microsoft.com/office/drawing/2016/SVG/main" r:embed="rId48"/>
+                <asvg:svgBlip xmlns:asvg="http://schemas.microsoft.com/office/drawing/2016/SVG/main" xmlns="" r:embed="rId48"/>
               </a:ext>
             </a:extLst>
           </a:blip>
@@ -18776,7 +18788,7 @@
           <a:blip r:embed="rId49">
             <a:extLst>
               <a:ext uri="{96DAC541-7B7A-43D3-8B79-37D633B846F1}">
-                <asvg:svgBlip xmlns="" xmlns:asvg="http://schemas.microsoft.com/office/drawing/2016/SVG/main" r:embed="rId29"/>
+                <asvg:svgBlip xmlns:asvg="http://schemas.microsoft.com/office/drawing/2016/SVG/main" xmlns="" r:embed="rId29"/>
               </a:ext>
             </a:extLst>
           </a:blip>
@@ -18812,7 +18824,7 @@
           <a:blip r:embed="rId50">
             <a:extLst>
               <a:ext uri="{96DAC541-7B7A-43D3-8B79-37D633B846F1}">
-                <asvg:svgBlip xmlns="" xmlns:asvg="http://schemas.microsoft.com/office/drawing/2016/SVG/main" r:embed="rId31"/>
+                <asvg:svgBlip xmlns:asvg="http://schemas.microsoft.com/office/drawing/2016/SVG/main" xmlns="" r:embed="rId31"/>
               </a:ext>
             </a:extLst>
           </a:blip>
@@ -19061,7 +19073,7 @@
           <a:blip r:embed="rId49">
             <a:extLst>
               <a:ext uri="{96DAC541-7B7A-43D3-8B79-37D633B846F1}">
-                <asvg:svgBlip xmlns="" xmlns:asvg="http://schemas.microsoft.com/office/drawing/2016/SVG/main" r:embed="rId29"/>
+                <asvg:svgBlip xmlns:asvg="http://schemas.microsoft.com/office/drawing/2016/SVG/main" xmlns="" r:embed="rId29"/>
               </a:ext>
             </a:extLst>
           </a:blip>
@@ -19097,7 +19109,7 @@
           <a:blip r:embed="rId50">
             <a:extLst>
               <a:ext uri="{96DAC541-7B7A-43D3-8B79-37D633B846F1}">
-                <asvg:svgBlip xmlns="" xmlns:asvg="http://schemas.microsoft.com/office/drawing/2016/SVG/main" r:embed="rId31"/>
+                <asvg:svgBlip xmlns:asvg="http://schemas.microsoft.com/office/drawing/2016/SVG/main" xmlns="" r:embed="rId31"/>
               </a:ext>
             </a:extLst>
           </a:blip>
@@ -19296,13 +19308,13 @@
         </p:nvSpPr>
         <p:spPr>
           <a:xfrm>
-            <a:off x="8639674" y="5174775"/>
-            <a:ext cx="2570521" cy="890617"/>
+            <a:off x="8489760" y="5124696"/>
+            <a:ext cx="3375876" cy="1246674"/>
           </a:xfrm>
           <a:prstGeom prst="wedgeRectCallout">
             <a:avLst>
-              <a:gd name="adj1" fmla="val -23655"/>
-              <a:gd name="adj2" fmla="val -133803"/>
+              <a:gd name="adj1" fmla="val -25859"/>
+              <a:gd name="adj2" fmla="val -107129"/>
             </a:avLst>
           </a:prstGeom>
         </p:spPr>
@@ -19328,7 +19340,15 @@
           <a:p>
             <a:r>
               <a:rPr lang="en-US" sz="1200" dirty="0" smtClean="0"/>
-              <a:t>An IAM Role attached to the Lambda function controls whether your Lambda function can access to other AWS resources such as </a:t>
+              <a:t>An IAM Role attached to the Lambda function controls whether your Lambda function can access to other AWS </a:t>
+            </a:r>
+            <a:r>
+              <a:rPr lang="en-US" sz="1200" dirty="0" smtClean="0"/>
+              <a:t>services </a:t>
+            </a:r>
+            <a:r>
+              <a:rPr lang="en-US" sz="1200" dirty="0" smtClean="0"/>
+              <a:t>such as </a:t>
             </a:r>
             <a:r>
               <a:rPr lang="en-US" sz="1200" dirty="0" err="1" smtClean="0"/>
@@ -19337,6 +19357,32 @@
             <a:r>
               <a:rPr lang="en-US" sz="1200" dirty="0" smtClean="0"/>
               <a:t>.</a:t>
+            </a:r>
+          </a:p>
+          <a:p>
+            <a:r>
+              <a:rPr lang="en-US" sz="1200" b="1" dirty="0" smtClean="0">
+                <a:solidFill>
+                  <a:schemeClr val="bg1"/>
+                </a:solidFill>
+              </a:rPr>
+              <a:t>Please take a note that the permissions of the Authenticated Role associated to your </a:t>
+            </a:r>
+            <a:r>
+              <a:rPr lang="en-US" sz="1200" b="1" dirty="0" err="1" smtClean="0">
+                <a:solidFill>
+                  <a:schemeClr val="bg1"/>
+                </a:solidFill>
+              </a:rPr>
+              <a:t>Cognito</a:t>
+            </a:r>
+            <a:r>
+              <a:rPr lang="en-US" sz="1200" b="1" dirty="0" smtClean="0">
+                <a:solidFill>
+                  <a:schemeClr val="bg1"/>
+                </a:solidFill>
+              </a:rPr>
+              <a:t> Identity Pool never affects the authorization here.</a:t>
             </a:r>
           </a:p>
         </p:txBody>
@@ -19679,7 +19725,7 @@
           <a:blip r:embed="rId2">
             <a:extLst>
               <a:ext uri="{96DAC541-7B7A-43D3-8B79-37D633B846F1}">
-                <asvg:svgBlip xmlns:asvg="http://schemas.microsoft.com/office/drawing/2016/SVG/main" xmlns="" r:embed="rId15"/>
+                <asvg:svgBlip xmlns="" xmlns:asvg="http://schemas.microsoft.com/office/drawing/2016/SVG/main" r:embed="rId15"/>
               </a:ext>
             </a:extLst>
           </a:blip>
@@ -19779,7 +19825,7 @@
           <a:blip r:embed="rId16">
             <a:extLst>
               <a:ext uri="{96DAC541-7B7A-43D3-8B79-37D633B846F1}">
-                <asvg:svgBlip xmlns:asvg="http://schemas.microsoft.com/office/drawing/2016/SVG/main" xmlns="" r:embed="rId37"/>
+                <asvg:svgBlip xmlns="" xmlns:asvg="http://schemas.microsoft.com/office/drawing/2016/SVG/main" r:embed="rId37"/>
               </a:ext>
             </a:extLst>
           </a:blip>
@@ -19920,7 +19966,7 @@
           <a:blip r:embed="rId38">
             <a:extLst>
               <a:ext uri="{96DAC541-7B7A-43D3-8B79-37D633B846F1}">
-                <asvg:svgBlip xmlns:asvg="http://schemas.microsoft.com/office/drawing/2016/SVG/main" xmlns="" r:embed="rId9"/>
+                <asvg:svgBlip xmlns="" xmlns:asvg="http://schemas.microsoft.com/office/drawing/2016/SVG/main" r:embed="rId9"/>
               </a:ext>
             </a:extLst>
           </a:blip>
@@ -20012,7 +20058,7 @@
           <a:blip r:embed="rId38">
             <a:extLst>
               <a:ext uri="{96DAC541-7B7A-43D3-8B79-37D633B846F1}">
-                <asvg:svgBlip xmlns:asvg="http://schemas.microsoft.com/office/drawing/2016/SVG/main" xmlns="" r:embed="rId9"/>
+                <asvg:svgBlip xmlns="" xmlns:asvg="http://schemas.microsoft.com/office/drawing/2016/SVG/main" r:embed="rId9"/>
               </a:ext>
             </a:extLst>
           </a:blip>
@@ -20120,7 +20166,7 @@
           <a:blip r:embed="rId39">
             <a:extLst>
               <a:ext uri="{96DAC541-7B7A-43D3-8B79-37D633B846F1}">
-                <asvg:svgBlip xmlns:asvg="http://schemas.microsoft.com/office/drawing/2016/SVG/main" xmlns="" r:embed="rId11"/>
+                <asvg:svgBlip xmlns="" xmlns:asvg="http://schemas.microsoft.com/office/drawing/2016/SVG/main" r:embed="rId11"/>
               </a:ext>
             </a:extLst>
           </a:blip>
@@ -20156,7 +20202,7 @@
           <a:blip r:embed="rId40">
             <a:extLst>
               <a:ext uri="{96DAC541-7B7A-43D3-8B79-37D633B846F1}">
-                <asvg:svgBlip xmlns:asvg="http://schemas.microsoft.com/office/drawing/2016/SVG/main" xmlns="" r:embed="rId6"/>
+                <asvg:svgBlip xmlns="" xmlns:asvg="http://schemas.microsoft.com/office/drawing/2016/SVG/main" r:embed="rId6"/>
               </a:ext>
             </a:extLst>
           </a:blip>
@@ -20335,7 +20381,7 @@
           <a:blip r:embed="rId41">
             <a:extLst>
               <a:ext uri="{96DAC541-7B7A-43D3-8B79-37D633B846F1}">
-                <asvg:svgBlip xmlns:asvg="http://schemas.microsoft.com/office/drawing/2016/SVG/main" xmlns="" r:embed="rId5"/>
+                <asvg:svgBlip xmlns="" xmlns:asvg="http://schemas.microsoft.com/office/drawing/2016/SVG/main" r:embed="rId5"/>
               </a:ext>
             </a:extLst>
           </a:blip>
@@ -20454,7 +20500,7 @@
           <a:blip r:embed="rId42">
             <a:extLst>
               <a:ext uri="{96DAC541-7B7A-43D3-8B79-37D633B846F1}">
-                <asvg:svgBlip xmlns:asvg="http://schemas.microsoft.com/office/drawing/2016/SVG/main" xmlns="" r:embed="rId25"/>
+                <asvg:svgBlip xmlns="" xmlns:asvg="http://schemas.microsoft.com/office/drawing/2016/SVG/main" r:embed="rId25"/>
               </a:ext>
             </a:extLst>
           </a:blip>
@@ -20526,7 +20572,7 @@
           <a:blip r:embed="rId42">
             <a:extLst>
               <a:ext uri="{96DAC541-7B7A-43D3-8B79-37D633B846F1}">
-                <asvg:svgBlip xmlns:asvg="http://schemas.microsoft.com/office/drawing/2016/SVG/main" xmlns="" r:embed="rId25"/>
+                <asvg:svgBlip xmlns="" xmlns:asvg="http://schemas.microsoft.com/office/drawing/2016/SVG/main" r:embed="rId25"/>
               </a:ext>
             </a:extLst>
           </a:blip>
@@ -20694,7 +20740,7 @@
           <a:blip r:embed="rId43">
             <a:extLst>
               <a:ext uri="{96DAC541-7B7A-43D3-8B79-37D633B846F1}">
-                <asvg:svgBlip xmlns:asvg="http://schemas.microsoft.com/office/drawing/2016/SVG/main" xmlns="" r:embed="rId17"/>
+                <asvg:svgBlip xmlns="" xmlns:asvg="http://schemas.microsoft.com/office/drawing/2016/SVG/main" r:embed="rId17"/>
               </a:ext>
             </a:extLst>
           </a:blip>
@@ -20903,7 +20949,7 @@
           <a:blip r:embed="rId47">
             <a:extLst>
               <a:ext uri="{96DAC541-7B7A-43D3-8B79-37D633B846F1}">
-                <asvg:svgBlip xmlns="" xmlns:asvg="http://schemas.microsoft.com/office/drawing/2016/SVG/main" r:embed="rId48"/>
+                <asvg:svgBlip xmlns:asvg="http://schemas.microsoft.com/office/drawing/2016/SVG/main" xmlns="" r:embed="rId48"/>
               </a:ext>
             </a:extLst>
           </a:blip>
@@ -21057,7 +21103,7 @@
           <a:blip r:embed="rId49">
             <a:extLst>
               <a:ext uri="{96DAC541-7B7A-43D3-8B79-37D633B846F1}">
-                <asvg:svgBlip xmlns="" xmlns:asvg="http://schemas.microsoft.com/office/drawing/2016/SVG/main" r:embed="rId29"/>
+                <asvg:svgBlip xmlns:asvg="http://schemas.microsoft.com/office/drawing/2016/SVG/main" xmlns="" r:embed="rId29"/>
               </a:ext>
             </a:extLst>
           </a:blip>
@@ -21093,7 +21139,7 @@
           <a:blip r:embed="rId50">
             <a:extLst>
               <a:ext uri="{96DAC541-7B7A-43D3-8B79-37D633B846F1}">
-                <asvg:svgBlip xmlns="" xmlns:asvg="http://schemas.microsoft.com/office/drawing/2016/SVG/main" r:embed="rId31"/>
+                <asvg:svgBlip xmlns:asvg="http://schemas.microsoft.com/office/drawing/2016/SVG/main" xmlns="" r:embed="rId31"/>
               </a:ext>
             </a:extLst>
           </a:blip>
@@ -21342,7 +21388,7 @@
           <a:blip r:embed="rId49">
             <a:extLst>
               <a:ext uri="{96DAC541-7B7A-43D3-8B79-37D633B846F1}">
-                <asvg:svgBlip xmlns="" xmlns:asvg="http://schemas.microsoft.com/office/drawing/2016/SVG/main" r:embed="rId29"/>
+                <asvg:svgBlip xmlns:asvg="http://schemas.microsoft.com/office/drawing/2016/SVG/main" xmlns="" r:embed="rId29"/>
               </a:ext>
             </a:extLst>
           </a:blip>
@@ -21378,7 +21424,7 @@
           <a:blip r:embed="rId50">
             <a:extLst>
               <a:ext uri="{96DAC541-7B7A-43D3-8B79-37D633B846F1}">
-                <asvg:svgBlip xmlns="" xmlns:asvg="http://schemas.microsoft.com/office/drawing/2016/SVG/main" r:embed="rId31"/>
+                <asvg:svgBlip xmlns:asvg="http://schemas.microsoft.com/office/drawing/2016/SVG/main" xmlns="" r:embed="rId31"/>
               </a:ext>
             </a:extLst>
           </a:blip>
@@ -21867,7 +21913,7 @@
           <a:blip r:embed="rId2">
             <a:extLst>
               <a:ext uri="{96DAC541-7B7A-43D3-8B79-37D633B846F1}">
-                <asvg:svgBlip xmlns:asvg="http://schemas.microsoft.com/office/drawing/2016/SVG/main" xmlns="" r:embed="rId15"/>
+                <asvg:svgBlip xmlns="" xmlns:asvg="http://schemas.microsoft.com/office/drawing/2016/SVG/main" r:embed="rId15"/>
               </a:ext>
             </a:extLst>
           </a:blip>
@@ -21967,7 +22013,7 @@
           <a:blip r:embed="rId16">
             <a:extLst>
               <a:ext uri="{96DAC541-7B7A-43D3-8B79-37D633B846F1}">
-                <asvg:svgBlip xmlns:asvg="http://schemas.microsoft.com/office/drawing/2016/SVG/main" xmlns="" r:embed="rId37"/>
+                <asvg:svgBlip xmlns="" xmlns:asvg="http://schemas.microsoft.com/office/drawing/2016/SVG/main" r:embed="rId37"/>
               </a:ext>
             </a:extLst>
           </a:blip>
@@ -22108,7 +22154,7 @@
           <a:blip r:embed="rId38">
             <a:extLst>
               <a:ext uri="{96DAC541-7B7A-43D3-8B79-37D633B846F1}">
-                <asvg:svgBlip xmlns:asvg="http://schemas.microsoft.com/office/drawing/2016/SVG/main" xmlns="" r:embed="rId9"/>
+                <asvg:svgBlip xmlns="" xmlns:asvg="http://schemas.microsoft.com/office/drawing/2016/SVG/main" r:embed="rId9"/>
               </a:ext>
             </a:extLst>
           </a:blip>
@@ -22200,7 +22246,7 @@
           <a:blip r:embed="rId38">
             <a:extLst>
               <a:ext uri="{96DAC541-7B7A-43D3-8B79-37D633B846F1}">
-                <asvg:svgBlip xmlns:asvg="http://schemas.microsoft.com/office/drawing/2016/SVG/main" xmlns="" r:embed="rId9"/>
+                <asvg:svgBlip xmlns="" xmlns:asvg="http://schemas.microsoft.com/office/drawing/2016/SVG/main" r:embed="rId9"/>
               </a:ext>
             </a:extLst>
           </a:blip>
@@ -22308,7 +22354,7 @@
           <a:blip r:embed="rId39">
             <a:extLst>
               <a:ext uri="{96DAC541-7B7A-43D3-8B79-37D633B846F1}">
-                <asvg:svgBlip xmlns:asvg="http://schemas.microsoft.com/office/drawing/2016/SVG/main" xmlns="" r:embed="rId11"/>
+                <asvg:svgBlip xmlns="" xmlns:asvg="http://schemas.microsoft.com/office/drawing/2016/SVG/main" r:embed="rId11"/>
               </a:ext>
             </a:extLst>
           </a:blip>
@@ -22344,7 +22390,7 @@
           <a:blip r:embed="rId40">
             <a:extLst>
               <a:ext uri="{96DAC541-7B7A-43D3-8B79-37D633B846F1}">
-                <asvg:svgBlip xmlns:asvg="http://schemas.microsoft.com/office/drawing/2016/SVG/main" xmlns="" r:embed="rId6"/>
+                <asvg:svgBlip xmlns="" xmlns:asvg="http://schemas.microsoft.com/office/drawing/2016/SVG/main" r:embed="rId6"/>
               </a:ext>
             </a:extLst>
           </a:blip>
@@ -22523,7 +22569,7 @@
           <a:blip r:embed="rId41">
             <a:extLst>
               <a:ext uri="{96DAC541-7B7A-43D3-8B79-37D633B846F1}">
-                <asvg:svgBlip xmlns:asvg="http://schemas.microsoft.com/office/drawing/2016/SVG/main" xmlns="" r:embed="rId5"/>
+                <asvg:svgBlip xmlns="" xmlns:asvg="http://schemas.microsoft.com/office/drawing/2016/SVG/main" r:embed="rId5"/>
               </a:ext>
             </a:extLst>
           </a:blip>
@@ -22642,7 +22688,7 @@
           <a:blip r:embed="rId42">
             <a:extLst>
               <a:ext uri="{96DAC541-7B7A-43D3-8B79-37D633B846F1}">
-                <asvg:svgBlip xmlns:asvg="http://schemas.microsoft.com/office/drawing/2016/SVG/main" xmlns="" r:embed="rId25"/>
+                <asvg:svgBlip xmlns="" xmlns:asvg="http://schemas.microsoft.com/office/drawing/2016/SVG/main" r:embed="rId25"/>
               </a:ext>
             </a:extLst>
           </a:blip>
@@ -22714,7 +22760,7 @@
           <a:blip r:embed="rId42">
             <a:extLst>
               <a:ext uri="{96DAC541-7B7A-43D3-8B79-37D633B846F1}">
-                <asvg:svgBlip xmlns:asvg="http://schemas.microsoft.com/office/drawing/2016/SVG/main" xmlns="" r:embed="rId25"/>
+                <asvg:svgBlip xmlns="" xmlns:asvg="http://schemas.microsoft.com/office/drawing/2016/SVG/main" r:embed="rId25"/>
               </a:ext>
             </a:extLst>
           </a:blip>
@@ -22882,7 +22928,7 @@
           <a:blip r:embed="rId43">
             <a:extLst>
               <a:ext uri="{96DAC541-7B7A-43D3-8B79-37D633B846F1}">
-                <asvg:svgBlip xmlns:asvg="http://schemas.microsoft.com/office/drawing/2016/SVG/main" xmlns="" r:embed="rId17"/>
+                <asvg:svgBlip xmlns="" xmlns:asvg="http://schemas.microsoft.com/office/drawing/2016/SVG/main" r:embed="rId17"/>
               </a:ext>
             </a:extLst>
           </a:blip>
@@ -23091,7 +23137,7 @@
           <a:blip r:embed="rId47">
             <a:extLst>
               <a:ext uri="{96DAC541-7B7A-43D3-8B79-37D633B846F1}">
-                <asvg:svgBlip xmlns="" xmlns:asvg="http://schemas.microsoft.com/office/drawing/2016/SVG/main" r:embed="rId48"/>
+                <asvg:svgBlip xmlns:asvg="http://schemas.microsoft.com/office/drawing/2016/SVG/main" xmlns="" r:embed="rId48"/>
               </a:ext>
             </a:extLst>
           </a:blip>
@@ -23245,7 +23291,7 @@
           <a:blip r:embed="rId49">
             <a:extLst>
               <a:ext uri="{96DAC541-7B7A-43D3-8B79-37D633B846F1}">
-                <asvg:svgBlip xmlns="" xmlns:asvg="http://schemas.microsoft.com/office/drawing/2016/SVG/main" r:embed="rId29"/>
+                <asvg:svgBlip xmlns:asvg="http://schemas.microsoft.com/office/drawing/2016/SVG/main" xmlns="" r:embed="rId29"/>
               </a:ext>
             </a:extLst>
           </a:blip>
@@ -23281,7 +23327,7 @@
           <a:blip r:embed="rId50">
             <a:extLst>
               <a:ext uri="{96DAC541-7B7A-43D3-8B79-37D633B846F1}">
-                <asvg:svgBlip xmlns="" xmlns:asvg="http://schemas.microsoft.com/office/drawing/2016/SVG/main" r:embed="rId31"/>
+                <asvg:svgBlip xmlns:asvg="http://schemas.microsoft.com/office/drawing/2016/SVG/main" xmlns="" r:embed="rId31"/>
               </a:ext>
             </a:extLst>
           </a:blip>
@@ -23530,7 +23576,7 @@
           <a:blip r:embed="rId49">
             <a:extLst>
               <a:ext uri="{96DAC541-7B7A-43D3-8B79-37D633B846F1}">
-                <asvg:svgBlip xmlns="" xmlns:asvg="http://schemas.microsoft.com/office/drawing/2016/SVG/main" r:embed="rId29"/>
+                <asvg:svgBlip xmlns:asvg="http://schemas.microsoft.com/office/drawing/2016/SVG/main" xmlns="" r:embed="rId29"/>
               </a:ext>
             </a:extLst>
           </a:blip>
@@ -23566,7 +23612,7 @@
           <a:blip r:embed="rId50">
             <a:extLst>
               <a:ext uri="{96DAC541-7B7A-43D3-8B79-37D633B846F1}">
-                <asvg:svgBlip xmlns="" xmlns:asvg="http://schemas.microsoft.com/office/drawing/2016/SVG/main" r:embed="rId31"/>
+                <asvg:svgBlip xmlns:asvg="http://schemas.microsoft.com/office/drawing/2016/SVG/main" xmlns="" r:embed="rId31"/>
               </a:ext>
             </a:extLst>
           </a:blip>
@@ -23672,19 +23718,19 @@
       </p:sp>
       <p:sp>
         <p:nvSpPr>
-          <p:cNvPr id="72" name="四角形吹き出し 71"/>
+          <p:cNvPr id="58" name="四角形吹き出し 57"/>
           <p:cNvSpPr/>
           <p:nvPr/>
         </p:nvSpPr>
         <p:spPr>
           <a:xfrm>
-            <a:off x="8639674" y="5174775"/>
-            <a:ext cx="2570521" cy="890617"/>
+            <a:off x="8489760" y="5124696"/>
+            <a:ext cx="3375876" cy="1246674"/>
           </a:xfrm>
           <a:prstGeom prst="wedgeRectCallout">
             <a:avLst>
-              <a:gd name="adj1" fmla="val -23655"/>
-              <a:gd name="adj2" fmla="val -133803"/>
+              <a:gd name="adj1" fmla="val -25859"/>
+              <a:gd name="adj2" fmla="val -107129"/>
             </a:avLst>
           </a:prstGeom>
         </p:spPr>
@@ -23710,7 +23756,15 @@
           <a:p>
             <a:r>
               <a:rPr lang="en-US" sz="1200" dirty="0" smtClean="0"/>
-              <a:t>An IAM Role attached to the Lambda function controls whether your Lambda function can access to other AWS resources such as </a:t>
+              <a:t>An IAM Role attached to the Lambda function controls whether your Lambda function can access to other AWS </a:t>
+            </a:r>
+            <a:r>
+              <a:rPr lang="en-US" sz="1200" dirty="0" smtClean="0"/>
+              <a:t>services </a:t>
+            </a:r>
+            <a:r>
+              <a:rPr lang="en-US" sz="1200" dirty="0" smtClean="0"/>
+              <a:t>such as </a:t>
             </a:r>
             <a:r>
               <a:rPr lang="en-US" sz="1200" dirty="0" err="1" smtClean="0"/>
@@ -23719,6 +23773,32 @@
             <a:r>
               <a:rPr lang="en-US" sz="1200" dirty="0" smtClean="0"/>
               <a:t>.</a:t>
+            </a:r>
+          </a:p>
+          <a:p>
+            <a:r>
+              <a:rPr lang="en-US" sz="1200" b="1" dirty="0" smtClean="0">
+                <a:solidFill>
+                  <a:schemeClr val="bg1"/>
+                </a:solidFill>
+              </a:rPr>
+              <a:t>Please take a note that the permissions of the Authenticated Role associated to your </a:t>
+            </a:r>
+            <a:r>
+              <a:rPr lang="en-US" sz="1200" b="1" dirty="0" err="1" smtClean="0">
+                <a:solidFill>
+                  <a:schemeClr val="bg1"/>
+                </a:solidFill>
+              </a:rPr>
+              <a:t>Cognito</a:t>
+            </a:r>
+            <a:r>
+              <a:rPr lang="en-US" sz="1200" b="1" dirty="0" smtClean="0">
+                <a:solidFill>
+                  <a:schemeClr val="bg1"/>
+                </a:solidFill>
+              </a:rPr>
+              <a:t> Identity Pool never affects the authorization here.</a:t>
             </a:r>
           </a:p>
         </p:txBody>
@@ -24061,7 +24141,7 @@
           <a:blip r:embed="rId2">
             <a:extLst>
               <a:ext uri="{96DAC541-7B7A-43D3-8B79-37D633B846F1}">
-                <asvg:svgBlip xmlns:asvg="http://schemas.microsoft.com/office/drawing/2016/SVG/main" xmlns="" r:embed="rId15"/>
+                <asvg:svgBlip xmlns="" xmlns:asvg="http://schemas.microsoft.com/office/drawing/2016/SVG/main" r:embed="rId15"/>
               </a:ext>
             </a:extLst>
           </a:blip>
@@ -24161,7 +24241,7 @@
           <a:blip r:embed="rId16">
             <a:extLst>
               <a:ext uri="{96DAC541-7B7A-43D3-8B79-37D633B846F1}">
-                <asvg:svgBlip xmlns:asvg="http://schemas.microsoft.com/office/drawing/2016/SVG/main" xmlns="" r:embed="rId37"/>
+                <asvg:svgBlip xmlns="" xmlns:asvg="http://schemas.microsoft.com/office/drawing/2016/SVG/main" r:embed="rId37"/>
               </a:ext>
             </a:extLst>
           </a:blip>
@@ -24302,7 +24382,7 @@
           <a:blip r:embed="rId38">
             <a:extLst>
               <a:ext uri="{96DAC541-7B7A-43D3-8B79-37D633B846F1}">
-                <asvg:svgBlip xmlns:asvg="http://schemas.microsoft.com/office/drawing/2016/SVG/main" xmlns="" r:embed="rId9"/>
+                <asvg:svgBlip xmlns="" xmlns:asvg="http://schemas.microsoft.com/office/drawing/2016/SVG/main" r:embed="rId9"/>
               </a:ext>
             </a:extLst>
           </a:blip>
@@ -24394,7 +24474,7 @@
           <a:blip r:embed="rId38">
             <a:extLst>
               <a:ext uri="{96DAC541-7B7A-43D3-8B79-37D633B846F1}">
-                <asvg:svgBlip xmlns:asvg="http://schemas.microsoft.com/office/drawing/2016/SVG/main" xmlns="" r:embed="rId9"/>
+                <asvg:svgBlip xmlns="" xmlns:asvg="http://schemas.microsoft.com/office/drawing/2016/SVG/main" r:embed="rId9"/>
               </a:ext>
             </a:extLst>
           </a:blip>
@@ -24502,7 +24582,7 @@
           <a:blip r:embed="rId39">
             <a:extLst>
               <a:ext uri="{96DAC541-7B7A-43D3-8B79-37D633B846F1}">
-                <asvg:svgBlip xmlns:asvg="http://schemas.microsoft.com/office/drawing/2016/SVG/main" xmlns="" r:embed="rId11"/>
+                <asvg:svgBlip xmlns="" xmlns:asvg="http://schemas.microsoft.com/office/drawing/2016/SVG/main" r:embed="rId11"/>
               </a:ext>
             </a:extLst>
           </a:blip>
@@ -24538,7 +24618,7 @@
           <a:blip r:embed="rId40">
             <a:extLst>
               <a:ext uri="{96DAC541-7B7A-43D3-8B79-37D633B846F1}">
-                <asvg:svgBlip xmlns:asvg="http://schemas.microsoft.com/office/drawing/2016/SVG/main" xmlns="" r:embed="rId6"/>
+                <asvg:svgBlip xmlns="" xmlns:asvg="http://schemas.microsoft.com/office/drawing/2016/SVG/main" r:embed="rId6"/>
               </a:ext>
             </a:extLst>
           </a:blip>
@@ -24717,7 +24797,7 @@
           <a:blip r:embed="rId41">
             <a:extLst>
               <a:ext uri="{96DAC541-7B7A-43D3-8B79-37D633B846F1}">
-                <asvg:svgBlip xmlns:asvg="http://schemas.microsoft.com/office/drawing/2016/SVG/main" xmlns="" r:embed="rId5"/>
+                <asvg:svgBlip xmlns="" xmlns:asvg="http://schemas.microsoft.com/office/drawing/2016/SVG/main" r:embed="rId5"/>
               </a:ext>
             </a:extLst>
           </a:blip>
@@ -24836,7 +24916,7 @@
           <a:blip r:embed="rId42">
             <a:extLst>
               <a:ext uri="{96DAC541-7B7A-43D3-8B79-37D633B846F1}">
-                <asvg:svgBlip xmlns:asvg="http://schemas.microsoft.com/office/drawing/2016/SVG/main" xmlns="" r:embed="rId25"/>
+                <asvg:svgBlip xmlns="" xmlns:asvg="http://schemas.microsoft.com/office/drawing/2016/SVG/main" r:embed="rId25"/>
               </a:ext>
             </a:extLst>
           </a:blip>
@@ -24908,7 +24988,7 @@
           <a:blip r:embed="rId42">
             <a:extLst>
               <a:ext uri="{96DAC541-7B7A-43D3-8B79-37D633B846F1}">
-                <asvg:svgBlip xmlns:asvg="http://schemas.microsoft.com/office/drawing/2016/SVG/main" xmlns="" r:embed="rId25"/>
+                <asvg:svgBlip xmlns="" xmlns:asvg="http://schemas.microsoft.com/office/drawing/2016/SVG/main" r:embed="rId25"/>
               </a:ext>
             </a:extLst>
           </a:blip>
@@ -25076,7 +25156,7 @@
           <a:blip r:embed="rId43">
             <a:extLst>
               <a:ext uri="{96DAC541-7B7A-43D3-8B79-37D633B846F1}">
-                <asvg:svgBlip xmlns:asvg="http://schemas.microsoft.com/office/drawing/2016/SVG/main" xmlns="" r:embed="rId17"/>
+                <asvg:svgBlip xmlns="" xmlns:asvg="http://schemas.microsoft.com/office/drawing/2016/SVG/main" r:embed="rId17"/>
               </a:ext>
             </a:extLst>
           </a:blip>
@@ -25285,7 +25365,7 @@
           <a:blip r:embed="rId47">
             <a:extLst>
               <a:ext uri="{96DAC541-7B7A-43D3-8B79-37D633B846F1}">
-                <asvg:svgBlip xmlns="" xmlns:asvg="http://schemas.microsoft.com/office/drawing/2016/SVG/main" r:embed="rId48"/>
+                <asvg:svgBlip xmlns:asvg="http://schemas.microsoft.com/office/drawing/2016/SVG/main" xmlns="" r:embed="rId48"/>
               </a:ext>
             </a:extLst>
           </a:blip>
@@ -25439,7 +25519,7 @@
           <a:blip r:embed="rId49">
             <a:extLst>
               <a:ext uri="{96DAC541-7B7A-43D3-8B79-37D633B846F1}">
-                <asvg:svgBlip xmlns="" xmlns:asvg="http://schemas.microsoft.com/office/drawing/2016/SVG/main" r:embed="rId29"/>
+                <asvg:svgBlip xmlns:asvg="http://schemas.microsoft.com/office/drawing/2016/SVG/main" xmlns="" r:embed="rId29"/>
               </a:ext>
             </a:extLst>
           </a:blip>
@@ -25475,7 +25555,7 @@
           <a:blip r:embed="rId50">
             <a:extLst>
               <a:ext uri="{96DAC541-7B7A-43D3-8B79-37D633B846F1}">
-                <asvg:svgBlip xmlns="" xmlns:asvg="http://schemas.microsoft.com/office/drawing/2016/SVG/main" r:embed="rId31"/>
+                <asvg:svgBlip xmlns:asvg="http://schemas.microsoft.com/office/drawing/2016/SVG/main" xmlns="" r:embed="rId31"/>
               </a:ext>
             </a:extLst>
           </a:blip>
@@ -25724,7 +25804,7 @@
           <a:blip r:embed="rId49">
             <a:extLst>
               <a:ext uri="{96DAC541-7B7A-43D3-8B79-37D633B846F1}">
-                <asvg:svgBlip xmlns="" xmlns:asvg="http://schemas.microsoft.com/office/drawing/2016/SVG/main" r:embed="rId29"/>
+                <asvg:svgBlip xmlns:asvg="http://schemas.microsoft.com/office/drawing/2016/SVG/main" xmlns="" r:embed="rId29"/>
               </a:ext>
             </a:extLst>
           </a:blip>
@@ -25760,7 +25840,7 @@
           <a:blip r:embed="rId50">
             <a:extLst>
               <a:ext uri="{96DAC541-7B7A-43D3-8B79-37D633B846F1}">
-                <asvg:svgBlip xmlns="" xmlns:asvg="http://schemas.microsoft.com/office/drawing/2016/SVG/main" r:embed="rId31"/>
+                <asvg:svgBlip xmlns:asvg="http://schemas.microsoft.com/office/drawing/2016/SVG/main" xmlns="" r:embed="rId31"/>
               </a:ext>
             </a:extLst>
           </a:blip>
@@ -26476,7 +26556,7 @@
           <a:blip r:embed="rId2">
             <a:extLst>
               <a:ext uri="{96DAC541-7B7A-43D3-8B79-37D633B846F1}">
-                <asvg:svgBlip xmlns:asvg="http://schemas.microsoft.com/office/drawing/2016/SVG/main" xmlns="" r:embed="rId15"/>
+                <asvg:svgBlip xmlns="" xmlns:asvg="http://schemas.microsoft.com/office/drawing/2016/SVG/main" r:embed="rId15"/>
               </a:ext>
             </a:extLst>
           </a:blip>
@@ -26576,7 +26656,7 @@
           <a:blip r:embed="rId16">
             <a:extLst>
               <a:ext uri="{96DAC541-7B7A-43D3-8B79-37D633B846F1}">
-                <asvg:svgBlip xmlns:asvg="http://schemas.microsoft.com/office/drawing/2016/SVG/main" xmlns="" r:embed="rId37"/>
+                <asvg:svgBlip xmlns="" xmlns:asvg="http://schemas.microsoft.com/office/drawing/2016/SVG/main" r:embed="rId37"/>
               </a:ext>
             </a:extLst>
           </a:blip>
@@ -26717,7 +26797,7 @@
           <a:blip r:embed="rId38">
             <a:extLst>
               <a:ext uri="{96DAC541-7B7A-43D3-8B79-37D633B846F1}">
-                <asvg:svgBlip xmlns:asvg="http://schemas.microsoft.com/office/drawing/2016/SVG/main" xmlns="" r:embed="rId9"/>
+                <asvg:svgBlip xmlns="" xmlns:asvg="http://schemas.microsoft.com/office/drawing/2016/SVG/main" r:embed="rId9"/>
               </a:ext>
             </a:extLst>
           </a:blip>
@@ -26809,7 +26889,7 @@
           <a:blip r:embed="rId38">
             <a:extLst>
               <a:ext uri="{96DAC541-7B7A-43D3-8B79-37D633B846F1}">
-                <asvg:svgBlip xmlns:asvg="http://schemas.microsoft.com/office/drawing/2016/SVG/main" xmlns="" r:embed="rId9"/>
+                <asvg:svgBlip xmlns="" xmlns:asvg="http://schemas.microsoft.com/office/drawing/2016/SVG/main" r:embed="rId9"/>
               </a:ext>
             </a:extLst>
           </a:blip>
@@ -26917,7 +26997,7 @@
           <a:blip r:embed="rId39">
             <a:extLst>
               <a:ext uri="{96DAC541-7B7A-43D3-8B79-37D633B846F1}">
-                <asvg:svgBlip xmlns:asvg="http://schemas.microsoft.com/office/drawing/2016/SVG/main" xmlns="" r:embed="rId11"/>
+                <asvg:svgBlip xmlns="" xmlns:asvg="http://schemas.microsoft.com/office/drawing/2016/SVG/main" r:embed="rId11"/>
               </a:ext>
             </a:extLst>
           </a:blip>
@@ -26953,7 +27033,7 @@
           <a:blip r:embed="rId40">
             <a:extLst>
               <a:ext uri="{96DAC541-7B7A-43D3-8B79-37D633B846F1}">
-                <asvg:svgBlip xmlns:asvg="http://schemas.microsoft.com/office/drawing/2016/SVG/main" xmlns="" r:embed="rId6"/>
+                <asvg:svgBlip xmlns="" xmlns:asvg="http://schemas.microsoft.com/office/drawing/2016/SVG/main" r:embed="rId6"/>
               </a:ext>
             </a:extLst>
           </a:blip>
@@ -27132,7 +27212,7 @@
           <a:blip r:embed="rId41">
             <a:extLst>
               <a:ext uri="{96DAC541-7B7A-43D3-8B79-37D633B846F1}">
-                <asvg:svgBlip xmlns:asvg="http://schemas.microsoft.com/office/drawing/2016/SVG/main" xmlns="" r:embed="rId5"/>
+                <asvg:svgBlip xmlns="" xmlns:asvg="http://schemas.microsoft.com/office/drawing/2016/SVG/main" r:embed="rId5"/>
               </a:ext>
             </a:extLst>
           </a:blip>
@@ -27251,7 +27331,7 @@
           <a:blip r:embed="rId42">
             <a:extLst>
               <a:ext uri="{96DAC541-7B7A-43D3-8B79-37D633B846F1}">
-                <asvg:svgBlip xmlns:asvg="http://schemas.microsoft.com/office/drawing/2016/SVG/main" xmlns="" r:embed="rId25"/>
+                <asvg:svgBlip xmlns="" xmlns:asvg="http://schemas.microsoft.com/office/drawing/2016/SVG/main" r:embed="rId25"/>
               </a:ext>
             </a:extLst>
           </a:blip>
@@ -27323,7 +27403,7 @@
           <a:blip r:embed="rId42">
             <a:extLst>
               <a:ext uri="{96DAC541-7B7A-43D3-8B79-37D633B846F1}">
-                <asvg:svgBlip xmlns:asvg="http://schemas.microsoft.com/office/drawing/2016/SVG/main" xmlns="" r:embed="rId25"/>
+                <asvg:svgBlip xmlns="" xmlns:asvg="http://schemas.microsoft.com/office/drawing/2016/SVG/main" r:embed="rId25"/>
               </a:ext>
             </a:extLst>
           </a:blip>
@@ -27491,7 +27571,7 @@
           <a:blip r:embed="rId43">
             <a:extLst>
               <a:ext uri="{96DAC541-7B7A-43D3-8B79-37D633B846F1}">
-                <asvg:svgBlip xmlns:asvg="http://schemas.microsoft.com/office/drawing/2016/SVG/main" xmlns="" r:embed="rId17"/>
+                <asvg:svgBlip xmlns="" xmlns:asvg="http://schemas.microsoft.com/office/drawing/2016/SVG/main" r:embed="rId17"/>
               </a:ext>
             </a:extLst>
           </a:blip>
@@ -27700,7 +27780,7 @@
           <a:blip r:embed="rId47">
             <a:extLst>
               <a:ext uri="{96DAC541-7B7A-43D3-8B79-37D633B846F1}">
-                <asvg:svgBlip xmlns="" xmlns:asvg="http://schemas.microsoft.com/office/drawing/2016/SVG/main" r:embed="rId48"/>
+                <asvg:svgBlip xmlns:asvg="http://schemas.microsoft.com/office/drawing/2016/SVG/main" xmlns="" r:embed="rId48"/>
               </a:ext>
             </a:extLst>
           </a:blip>
@@ -27854,7 +27934,7 @@
           <a:blip r:embed="rId49">
             <a:extLst>
               <a:ext uri="{96DAC541-7B7A-43D3-8B79-37D633B846F1}">
-                <asvg:svgBlip xmlns="" xmlns:asvg="http://schemas.microsoft.com/office/drawing/2016/SVG/main" r:embed="rId29"/>
+                <asvg:svgBlip xmlns:asvg="http://schemas.microsoft.com/office/drawing/2016/SVG/main" xmlns="" r:embed="rId29"/>
               </a:ext>
             </a:extLst>
           </a:blip>
@@ -27890,7 +27970,7 @@
           <a:blip r:embed="rId50">
             <a:extLst>
               <a:ext uri="{96DAC541-7B7A-43D3-8B79-37D633B846F1}">
-                <asvg:svgBlip xmlns="" xmlns:asvg="http://schemas.microsoft.com/office/drawing/2016/SVG/main" r:embed="rId31"/>
+                <asvg:svgBlip xmlns:asvg="http://schemas.microsoft.com/office/drawing/2016/SVG/main" xmlns="" r:embed="rId31"/>
               </a:ext>
             </a:extLst>
           </a:blip>
@@ -28139,7 +28219,7 @@
           <a:blip r:embed="rId49">
             <a:extLst>
               <a:ext uri="{96DAC541-7B7A-43D3-8B79-37D633B846F1}">
-                <asvg:svgBlip xmlns="" xmlns:asvg="http://schemas.microsoft.com/office/drawing/2016/SVG/main" r:embed="rId29"/>
+                <asvg:svgBlip xmlns:asvg="http://schemas.microsoft.com/office/drawing/2016/SVG/main" xmlns="" r:embed="rId29"/>
               </a:ext>
             </a:extLst>
           </a:blip>
@@ -28175,7 +28255,7 @@
           <a:blip r:embed="rId50">
             <a:extLst>
               <a:ext uri="{96DAC541-7B7A-43D3-8B79-37D633B846F1}">
-                <asvg:svgBlip xmlns="" xmlns:asvg="http://schemas.microsoft.com/office/drawing/2016/SVG/main" r:embed="rId31"/>
+                <asvg:svgBlip xmlns:asvg="http://schemas.microsoft.com/office/drawing/2016/SVG/main" xmlns="" r:embed="rId31"/>
               </a:ext>
             </a:extLst>
           </a:blip>
@@ -28903,7 +28983,7 @@
           <a:blip r:embed="rId2">
             <a:extLst>
               <a:ext uri="{96DAC541-7B7A-43D3-8B79-37D633B846F1}">
-                <asvg:svgBlip xmlns:asvg="http://schemas.microsoft.com/office/drawing/2016/SVG/main" xmlns="" r:embed="rId15"/>
+                <asvg:svgBlip xmlns="" xmlns:asvg="http://schemas.microsoft.com/office/drawing/2016/SVG/main" r:embed="rId15"/>
               </a:ext>
             </a:extLst>
           </a:blip>
@@ -29003,7 +29083,7 @@
           <a:blip r:embed="rId16">
             <a:extLst>
               <a:ext uri="{96DAC541-7B7A-43D3-8B79-37D633B846F1}">
-                <asvg:svgBlip xmlns:asvg="http://schemas.microsoft.com/office/drawing/2016/SVG/main" xmlns="" r:embed="rId37"/>
+                <asvg:svgBlip xmlns="" xmlns:asvg="http://schemas.microsoft.com/office/drawing/2016/SVG/main" r:embed="rId37"/>
               </a:ext>
             </a:extLst>
           </a:blip>
@@ -29144,7 +29224,7 @@
           <a:blip r:embed="rId38">
             <a:extLst>
               <a:ext uri="{96DAC541-7B7A-43D3-8B79-37D633B846F1}">
-                <asvg:svgBlip xmlns:asvg="http://schemas.microsoft.com/office/drawing/2016/SVG/main" xmlns="" r:embed="rId9"/>
+                <asvg:svgBlip xmlns="" xmlns:asvg="http://schemas.microsoft.com/office/drawing/2016/SVG/main" r:embed="rId9"/>
               </a:ext>
             </a:extLst>
           </a:blip>
@@ -29236,7 +29316,7 @@
           <a:blip r:embed="rId38">
             <a:extLst>
               <a:ext uri="{96DAC541-7B7A-43D3-8B79-37D633B846F1}">
-                <asvg:svgBlip xmlns:asvg="http://schemas.microsoft.com/office/drawing/2016/SVG/main" xmlns="" r:embed="rId9"/>
+                <asvg:svgBlip xmlns="" xmlns:asvg="http://schemas.microsoft.com/office/drawing/2016/SVG/main" r:embed="rId9"/>
               </a:ext>
             </a:extLst>
           </a:blip>
@@ -29344,7 +29424,7 @@
           <a:blip r:embed="rId39">
             <a:extLst>
               <a:ext uri="{96DAC541-7B7A-43D3-8B79-37D633B846F1}">
-                <asvg:svgBlip xmlns:asvg="http://schemas.microsoft.com/office/drawing/2016/SVG/main" xmlns="" r:embed="rId11"/>
+                <asvg:svgBlip xmlns="" xmlns:asvg="http://schemas.microsoft.com/office/drawing/2016/SVG/main" r:embed="rId11"/>
               </a:ext>
             </a:extLst>
           </a:blip>
@@ -29380,7 +29460,7 @@
           <a:blip r:embed="rId40">
             <a:extLst>
               <a:ext uri="{96DAC541-7B7A-43D3-8B79-37D633B846F1}">
-                <asvg:svgBlip xmlns:asvg="http://schemas.microsoft.com/office/drawing/2016/SVG/main" xmlns="" r:embed="rId6"/>
+                <asvg:svgBlip xmlns="" xmlns:asvg="http://schemas.microsoft.com/office/drawing/2016/SVG/main" r:embed="rId6"/>
               </a:ext>
             </a:extLst>
           </a:blip>
@@ -29559,7 +29639,7 @@
           <a:blip r:embed="rId41">
             <a:extLst>
               <a:ext uri="{96DAC541-7B7A-43D3-8B79-37D633B846F1}">
-                <asvg:svgBlip xmlns:asvg="http://schemas.microsoft.com/office/drawing/2016/SVG/main" xmlns="" r:embed="rId5"/>
+                <asvg:svgBlip xmlns="" xmlns:asvg="http://schemas.microsoft.com/office/drawing/2016/SVG/main" r:embed="rId5"/>
               </a:ext>
             </a:extLst>
           </a:blip>
@@ -29678,7 +29758,7 @@
           <a:blip r:embed="rId42">
             <a:extLst>
               <a:ext uri="{96DAC541-7B7A-43D3-8B79-37D633B846F1}">
-                <asvg:svgBlip xmlns:asvg="http://schemas.microsoft.com/office/drawing/2016/SVG/main" xmlns="" r:embed="rId25"/>
+                <asvg:svgBlip xmlns="" xmlns:asvg="http://schemas.microsoft.com/office/drawing/2016/SVG/main" r:embed="rId25"/>
               </a:ext>
             </a:extLst>
           </a:blip>
@@ -29750,7 +29830,7 @@
           <a:blip r:embed="rId42">
             <a:extLst>
               <a:ext uri="{96DAC541-7B7A-43D3-8B79-37D633B846F1}">
-                <asvg:svgBlip xmlns:asvg="http://schemas.microsoft.com/office/drawing/2016/SVG/main" xmlns="" r:embed="rId25"/>
+                <asvg:svgBlip xmlns="" xmlns:asvg="http://schemas.microsoft.com/office/drawing/2016/SVG/main" r:embed="rId25"/>
               </a:ext>
             </a:extLst>
           </a:blip>
@@ -29918,7 +29998,7 @@
           <a:blip r:embed="rId43">
             <a:extLst>
               <a:ext uri="{96DAC541-7B7A-43D3-8B79-37D633B846F1}">
-                <asvg:svgBlip xmlns:asvg="http://schemas.microsoft.com/office/drawing/2016/SVG/main" xmlns="" r:embed="rId17"/>
+                <asvg:svgBlip xmlns="" xmlns:asvg="http://schemas.microsoft.com/office/drawing/2016/SVG/main" r:embed="rId17"/>
               </a:ext>
             </a:extLst>
           </a:blip>
@@ -30127,7 +30207,7 @@
           <a:blip r:embed="rId47">
             <a:extLst>
               <a:ext uri="{96DAC541-7B7A-43D3-8B79-37D633B846F1}">
-                <asvg:svgBlip xmlns="" xmlns:asvg="http://schemas.microsoft.com/office/drawing/2016/SVG/main" r:embed="rId48"/>
+                <asvg:svgBlip xmlns:asvg="http://schemas.microsoft.com/office/drawing/2016/SVG/main" xmlns="" r:embed="rId48"/>
               </a:ext>
             </a:extLst>
           </a:blip>
@@ -30281,7 +30361,7 @@
           <a:blip r:embed="rId49">
             <a:extLst>
               <a:ext uri="{96DAC541-7B7A-43D3-8B79-37D633B846F1}">
-                <asvg:svgBlip xmlns="" xmlns:asvg="http://schemas.microsoft.com/office/drawing/2016/SVG/main" r:embed="rId29"/>
+                <asvg:svgBlip xmlns:asvg="http://schemas.microsoft.com/office/drawing/2016/SVG/main" xmlns="" r:embed="rId29"/>
               </a:ext>
             </a:extLst>
           </a:blip>
@@ -30317,7 +30397,7 @@
           <a:blip r:embed="rId50">
             <a:extLst>
               <a:ext uri="{96DAC541-7B7A-43D3-8B79-37D633B846F1}">
-                <asvg:svgBlip xmlns="" xmlns:asvg="http://schemas.microsoft.com/office/drawing/2016/SVG/main" r:embed="rId31"/>
+                <asvg:svgBlip xmlns:asvg="http://schemas.microsoft.com/office/drawing/2016/SVG/main" xmlns="" r:embed="rId31"/>
               </a:ext>
             </a:extLst>
           </a:blip>
@@ -30566,7 +30646,7 @@
           <a:blip r:embed="rId49">
             <a:extLst>
               <a:ext uri="{96DAC541-7B7A-43D3-8B79-37D633B846F1}">
-                <asvg:svgBlip xmlns="" xmlns:asvg="http://schemas.microsoft.com/office/drawing/2016/SVG/main" r:embed="rId29"/>
+                <asvg:svgBlip xmlns:asvg="http://schemas.microsoft.com/office/drawing/2016/SVG/main" xmlns="" r:embed="rId29"/>
               </a:ext>
             </a:extLst>
           </a:blip>
@@ -30602,7 +30682,7 @@
           <a:blip r:embed="rId50">
             <a:extLst>
               <a:ext uri="{96DAC541-7B7A-43D3-8B79-37D633B846F1}">
-                <asvg:svgBlip xmlns="" xmlns:asvg="http://schemas.microsoft.com/office/drawing/2016/SVG/main" r:embed="rId31"/>
+                <asvg:svgBlip xmlns:asvg="http://schemas.microsoft.com/office/drawing/2016/SVG/main" xmlns="" r:embed="rId31"/>
               </a:ext>
             </a:extLst>
           </a:blip>
@@ -31261,7 +31341,7 @@
           <a:blip r:embed="rId2">
             <a:extLst>
               <a:ext uri="{96DAC541-7B7A-43D3-8B79-37D633B846F1}">
-                <asvg:svgBlip xmlns:asvg="http://schemas.microsoft.com/office/drawing/2016/SVG/main" xmlns="" r:embed="rId15"/>
+                <asvg:svgBlip xmlns="" xmlns:asvg="http://schemas.microsoft.com/office/drawing/2016/SVG/main" r:embed="rId15"/>
               </a:ext>
             </a:extLst>
           </a:blip>
@@ -31361,7 +31441,7 @@
           <a:blip r:embed="rId16">
             <a:extLst>
               <a:ext uri="{96DAC541-7B7A-43D3-8B79-37D633B846F1}">
-                <asvg:svgBlip xmlns:asvg="http://schemas.microsoft.com/office/drawing/2016/SVG/main" xmlns="" r:embed="rId37"/>
+                <asvg:svgBlip xmlns="" xmlns:asvg="http://schemas.microsoft.com/office/drawing/2016/SVG/main" r:embed="rId37"/>
               </a:ext>
             </a:extLst>
           </a:blip>
@@ -31502,7 +31582,7 @@
           <a:blip r:embed="rId38">
             <a:extLst>
               <a:ext uri="{96DAC541-7B7A-43D3-8B79-37D633B846F1}">
-                <asvg:svgBlip xmlns:asvg="http://schemas.microsoft.com/office/drawing/2016/SVG/main" xmlns="" r:embed="rId9"/>
+                <asvg:svgBlip xmlns="" xmlns:asvg="http://schemas.microsoft.com/office/drawing/2016/SVG/main" r:embed="rId9"/>
               </a:ext>
             </a:extLst>
           </a:blip>
@@ -31594,7 +31674,7 @@
           <a:blip r:embed="rId38">
             <a:extLst>
               <a:ext uri="{96DAC541-7B7A-43D3-8B79-37D633B846F1}">
-                <asvg:svgBlip xmlns:asvg="http://schemas.microsoft.com/office/drawing/2016/SVG/main" xmlns="" r:embed="rId9"/>
+                <asvg:svgBlip xmlns="" xmlns:asvg="http://schemas.microsoft.com/office/drawing/2016/SVG/main" r:embed="rId9"/>
               </a:ext>
             </a:extLst>
           </a:blip>
@@ -31702,7 +31782,7 @@
           <a:blip r:embed="rId39">
             <a:extLst>
               <a:ext uri="{96DAC541-7B7A-43D3-8B79-37D633B846F1}">
-                <asvg:svgBlip xmlns:asvg="http://schemas.microsoft.com/office/drawing/2016/SVG/main" xmlns="" r:embed="rId11"/>
+                <asvg:svgBlip xmlns="" xmlns:asvg="http://schemas.microsoft.com/office/drawing/2016/SVG/main" r:embed="rId11"/>
               </a:ext>
             </a:extLst>
           </a:blip>
@@ -31738,7 +31818,7 @@
           <a:blip r:embed="rId40">
             <a:extLst>
               <a:ext uri="{96DAC541-7B7A-43D3-8B79-37D633B846F1}">
-                <asvg:svgBlip xmlns:asvg="http://schemas.microsoft.com/office/drawing/2016/SVG/main" xmlns="" r:embed="rId6"/>
+                <asvg:svgBlip xmlns="" xmlns:asvg="http://schemas.microsoft.com/office/drawing/2016/SVG/main" r:embed="rId6"/>
               </a:ext>
             </a:extLst>
           </a:blip>
@@ -31917,7 +31997,7 @@
           <a:blip r:embed="rId41">
             <a:extLst>
               <a:ext uri="{96DAC541-7B7A-43D3-8B79-37D633B846F1}">
-                <asvg:svgBlip xmlns:asvg="http://schemas.microsoft.com/office/drawing/2016/SVG/main" xmlns="" r:embed="rId5"/>
+                <asvg:svgBlip xmlns="" xmlns:asvg="http://schemas.microsoft.com/office/drawing/2016/SVG/main" r:embed="rId5"/>
               </a:ext>
             </a:extLst>
           </a:blip>
@@ -32036,7 +32116,7 @@
           <a:blip r:embed="rId42">
             <a:extLst>
               <a:ext uri="{96DAC541-7B7A-43D3-8B79-37D633B846F1}">
-                <asvg:svgBlip xmlns:asvg="http://schemas.microsoft.com/office/drawing/2016/SVG/main" xmlns="" r:embed="rId25"/>
+                <asvg:svgBlip xmlns="" xmlns:asvg="http://schemas.microsoft.com/office/drawing/2016/SVG/main" r:embed="rId25"/>
               </a:ext>
             </a:extLst>
           </a:blip>
@@ -32108,7 +32188,7 @@
           <a:blip r:embed="rId42">
             <a:extLst>
               <a:ext uri="{96DAC541-7B7A-43D3-8B79-37D633B846F1}">
-                <asvg:svgBlip xmlns:asvg="http://schemas.microsoft.com/office/drawing/2016/SVG/main" xmlns="" r:embed="rId25"/>
+                <asvg:svgBlip xmlns="" xmlns:asvg="http://schemas.microsoft.com/office/drawing/2016/SVG/main" r:embed="rId25"/>
               </a:ext>
             </a:extLst>
           </a:blip>
@@ -32276,7 +32356,7 @@
           <a:blip r:embed="rId43">
             <a:extLst>
               <a:ext uri="{96DAC541-7B7A-43D3-8B79-37D633B846F1}">
-                <asvg:svgBlip xmlns:asvg="http://schemas.microsoft.com/office/drawing/2016/SVG/main" xmlns="" r:embed="rId17"/>
+                <asvg:svgBlip xmlns="" xmlns:asvg="http://schemas.microsoft.com/office/drawing/2016/SVG/main" r:embed="rId17"/>
               </a:ext>
             </a:extLst>
           </a:blip>
@@ -32485,7 +32565,7 @@
           <a:blip r:embed="rId47">
             <a:extLst>
               <a:ext uri="{96DAC541-7B7A-43D3-8B79-37D633B846F1}">
-                <asvg:svgBlip xmlns="" xmlns:asvg="http://schemas.microsoft.com/office/drawing/2016/SVG/main" r:embed="rId48"/>
+                <asvg:svgBlip xmlns:asvg="http://schemas.microsoft.com/office/drawing/2016/SVG/main" xmlns="" r:embed="rId48"/>
               </a:ext>
             </a:extLst>
           </a:blip>
@@ -32639,7 +32719,7 @@
           <a:blip r:embed="rId49">
             <a:extLst>
               <a:ext uri="{96DAC541-7B7A-43D3-8B79-37D633B846F1}">
-                <asvg:svgBlip xmlns="" xmlns:asvg="http://schemas.microsoft.com/office/drawing/2016/SVG/main" r:embed="rId29"/>
+                <asvg:svgBlip xmlns:asvg="http://schemas.microsoft.com/office/drawing/2016/SVG/main" xmlns="" r:embed="rId29"/>
               </a:ext>
             </a:extLst>
           </a:blip>
@@ -32675,7 +32755,7 @@
           <a:blip r:embed="rId50">
             <a:extLst>
               <a:ext uri="{96DAC541-7B7A-43D3-8B79-37D633B846F1}">
-                <asvg:svgBlip xmlns="" xmlns:asvg="http://schemas.microsoft.com/office/drawing/2016/SVG/main" r:embed="rId31"/>
+                <asvg:svgBlip xmlns:asvg="http://schemas.microsoft.com/office/drawing/2016/SVG/main" xmlns="" r:embed="rId31"/>
               </a:ext>
             </a:extLst>
           </a:blip>
@@ -32924,7 +33004,7 @@
           <a:blip r:embed="rId49">
             <a:extLst>
               <a:ext uri="{96DAC541-7B7A-43D3-8B79-37D633B846F1}">
-                <asvg:svgBlip xmlns="" xmlns:asvg="http://schemas.microsoft.com/office/drawing/2016/SVG/main" r:embed="rId29"/>
+                <asvg:svgBlip xmlns:asvg="http://schemas.microsoft.com/office/drawing/2016/SVG/main" xmlns="" r:embed="rId29"/>
               </a:ext>
             </a:extLst>
           </a:blip>
@@ -32960,7 +33040,7 @@
           <a:blip r:embed="rId50">
             <a:extLst>
               <a:ext uri="{96DAC541-7B7A-43D3-8B79-37D633B846F1}">
-                <asvg:svgBlip xmlns="" xmlns:asvg="http://schemas.microsoft.com/office/drawing/2016/SVG/main" r:embed="rId31"/>
+                <asvg:svgBlip xmlns:asvg="http://schemas.microsoft.com/office/drawing/2016/SVG/main" xmlns="" r:embed="rId31"/>
               </a:ext>
             </a:extLst>
           </a:blip>

</xml_diff>